<commit_message>
EPE - Poster is reviewed.
</commit_message>
<xml_diff>
--- a/Paper/EPE 2018/Poster/EPE Poster.pptx
+++ b/Paper/EPE 2018/Poster/EPE Poster.pptx
@@ -1977,7 +1977,7 @@
         <p:spPr bwMode="auto">
           <a:xfrm>
             <a:off x="514350" y="508000"/>
-            <a:ext cx="29203650" cy="7010400"/>
+            <a:ext cx="29203650" cy="7224328"/>
           </a:xfrm>
           <a:prstGeom prst="roundRect">
             <a:avLst>
@@ -2148,62 +2148,6 @@
           </a:prstGeom>
         </p:spPr>
       </p:pic>
-      <p:sp>
-        <p:nvSpPr>
-          <p:cNvPr id="49" name="Text Box 14"/>
-          <p:cNvSpPr txBox="1">
-            <a:spLocks noChangeArrowheads="1"/>
-          </p:cNvSpPr>
-          <p:nvPr/>
-        </p:nvSpPr>
-        <p:spPr bwMode="auto">
-          <a:xfrm>
-            <a:off x="-548044" y="4455765"/>
-            <a:ext cx="13245158" cy="1723549"/>
-          </a:xfrm>
-          <a:prstGeom prst="rect">
-            <a:avLst/>
-          </a:prstGeom>
-          <a:noFill/>
-          <a:ln w="9525">
-            <a:noFill/>
-            <a:miter lim="800000"/>
-            <a:headEnd/>
-            <a:tailEnd/>
-          </a:ln>
-          <a:effectLst/>
-        </p:spPr>
-        <p:txBody>
-          <a:bodyPr wrap="square">
-            <a:spAutoFit/>
-          </a:bodyPr>
-          <a:lstStyle/>
-          <a:p>
-            <a:pPr defTabSz="4389438"/>
-            <a:r>
-              <a:rPr lang="tr-TR" sz="6600" noProof="1" smtClean="0"/>
-              <a:t>Furkan Karakaya</a:t>
-            </a:r>
-            <a:endParaRPr lang="en-US" sz="6600" noProof="1" smtClean="0"/>
-          </a:p>
-          <a:p>
-            <a:pPr defTabSz="4389438"/>
-            <a:r>
-              <a:rPr lang="tr-TR" sz="4000" i="1" noProof="1" smtClean="0"/>
-              <a:t>(furkan.karakaya</a:t>
-            </a:r>
-            <a:r>
-              <a:rPr lang="en-US" sz="4000" i="1" noProof="1" smtClean="0"/>
-              <a:t>@metu.edu.tr</a:t>
-            </a:r>
-            <a:r>
-              <a:rPr lang="tr-TR" sz="4000" i="1" noProof="1" smtClean="0"/>
-              <a:t>)</a:t>
-            </a:r>
-            <a:endParaRPr lang="en-US" sz="7200" noProof="1"/>
-          </a:p>
-        </p:txBody>
-      </p:sp>
       <p:pic>
         <p:nvPicPr>
           <p:cNvPr id="19" name="Resim 18"/>
@@ -2262,8 +2206,8 @@
         </p:nvSpPr>
         <p:spPr bwMode="auto">
           <a:xfrm>
-            <a:off x="16209454" y="4447641"/>
-            <a:ext cx="13245158" cy="1723549"/>
+            <a:off x="20825703" y="4447641"/>
+            <a:ext cx="6678634" cy="1723549"/>
           </a:xfrm>
           <a:prstGeom prst="rect">
             <a:avLst/>
@@ -2318,8 +2262,8 @@
         </p:nvSpPr>
         <p:spPr bwMode="auto">
           <a:xfrm>
-            <a:off x="8493596" y="6534970"/>
-            <a:ext cx="13245158" cy="830997"/>
+            <a:off x="7504373" y="6077630"/>
+            <a:ext cx="15328378" cy="1569660"/>
           </a:xfrm>
           <a:prstGeom prst="rect">
             <a:avLst/>
@@ -2342,15 +2286,39 @@
             <a:pPr defTabSz="4389438"/>
             <a:r>
               <a:rPr lang="en-US" sz="4800" b="1" i="1" noProof="1" smtClean="0"/>
-              <a:t>PowerLab Research Group</a:t>
+              <a:t>PowerLab Research </a:t>
+            </a:r>
+            <a:r>
+              <a:rPr lang="en-US" sz="4800" b="1" i="1" noProof="1" smtClean="0"/>
+              <a:t>Group</a:t>
+            </a:r>
+            <a:endParaRPr lang="tr-TR" sz="4800" b="1" i="1" noProof="1"/>
+          </a:p>
+          <a:p>
+            <a:pPr defTabSz="4389438"/>
+            <a:r>
+              <a:rPr lang="en-US" sz="4800" b="1" i="1" noProof="1" smtClean="0"/>
+              <a:t>M</a:t>
             </a:r>
             <a:r>
               <a:rPr lang="tr-TR" sz="4800" b="1" i="1" noProof="1" smtClean="0"/>
-              <a:t>, </a:t>
+              <a:t>iddle East Technical University (METU)</a:t>
+            </a:r>
+            <a:r>
+              <a:rPr lang="tr-TR" sz="4800" b="1" i="1" noProof="1"/>
+              <a:t> </a:t>
+            </a:r>
+            <a:r>
+              <a:rPr lang="tr-TR" sz="4800" b="1" i="1" noProof="1" smtClean="0"/>
+              <a:t>-</a:t>
             </a:r>
             <a:r>
               <a:rPr lang="en-US" sz="4800" b="1" i="1" noProof="1" smtClean="0"/>
-              <a:t>METU, ANKARA </a:t>
+              <a:t> </a:t>
+            </a:r>
+            <a:r>
+              <a:rPr lang="en-US" sz="4800" b="1" i="1" noProof="1" smtClean="0"/>
+              <a:t>ANKARA </a:t>
             </a:r>
             <a:endParaRPr lang="tr-TR" sz="4800" b="1" i="1" noProof="1" smtClean="0"/>
           </a:p>
@@ -2366,7 +2334,7 @@
         </p:nvSpPr>
         <p:spPr bwMode="auto">
           <a:xfrm>
-            <a:off x="8703074" y="4455765"/>
+            <a:off x="8550674" y="4455765"/>
             <a:ext cx="13245158" cy="1723549"/>
           </a:xfrm>
           <a:prstGeom prst="rect">
@@ -2398,7 +2366,11 @@
             <a:pPr defTabSz="4389438"/>
             <a:r>
               <a:rPr lang="tr-TR" sz="4000" i="1" noProof="1" smtClean="0"/>
-              <a:t>(ugurm</a:t>
+              <a:t>(</a:t>
+            </a:r>
+            <a:r>
+              <a:rPr lang="tr-TR" sz="4000" i="1" noProof="1" smtClean="0"/>
+              <a:t>mesut.ugur</a:t>
             </a:r>
             <a:r>
               <a:rPr lang="en-US" sz="4000" i="1" noProof="1" smtClean="0"/>
@@ -2412,30 +2384,101 @@
           </a:p>
         </p:txBody>
       </p:sp>
-      <p:pic>
-        <p:nvPicPr>
-          <p:cNvPr id="11" name="Resim 10"/>
-          <p:cNvPicPr>
-            <a:picLocks noChangeAspect="1"/>
-          </p:cNvPicPr>
+      <p:grpSp>
+        <p:nvGrpSpPr>
+          <p:cNvPr id="10" name="Group 9"/>
+          <p:cNvGrpSpPr/>
           <p:nvPr/>
-        </p:nvPicPr>
-        <p:blipFill>
-          <a:blip r:embed="rId6"/>
-          <a:stretch>
-            <a:fillRect/>
-          </a:stretch>
-        </p:blipFill>
-        <p:spPr>
+        </p:nvGrpSpPr>
+        <p:grpSpPr>
           <a:xfrm>
-            <a:off x="9587056" y="4663319"/>
-            <a:ext cx="847105" cy="1446705"/>
+            <a:off x="-1081444" y="4455765"/>
+            <a:ext cx="13245158" cy="1723549"/>
+            <a:chOff x="-548044" y="4455765"/>
+            <a:chExt cx="13245158" cy="1723549"/>
           </a:xfrm>
-          <a:prstGeom prst="rect">
-            <a:avLst/>
-          </a:prstGeom>
-        </p:spPr>
-      </p:pic>
+        </p:grpSpPr>
+        <p:sp>
+          <p:nvSpPr>
+            <p:cNvPr id="49" name="Text Box 14"/>
+            <p:cNvSpPr txBox="1">
+              <a:spLocks noChangeArrowheads="1"/>
+            </p:cNvSpPr>
+            <p:nvPr/>
+          </p:nvSpPr>
+          <p:spPr bwMode="auto">
+            <a:xfrm>
+              <a:off x="-548044" y="4455765"/>
+              <a:ext cx="13245158" cy="1723549"/>
+            </a:xfrm>
+            <a:prstGeom prst="rect">
+              <a:avLst/>
+            </a:prstGeom>
+            <a:noFill/>
+            <a:ln w="9525">
+              <a:noFill/>
+              <a:miter lim="800000"/>
+              <a:headEnd/>
+              <a:tailEnd/>
+            </a:ln>
+            <a:effectLst/>
+          </p:spPr>
+          <p:txBody>
+            <a:bodyPr wrap="square">
+              <a:spAutoFit/>
+            </a:bodyPr>
+            <a:lstStyle/>
+            <a:p>
+              <a:pPr defTabSz="4389438"/>
+              <a:r>
+                <a:rPr lang="tr-TR" sz="6600" noProof="1" smtClean="0"/>
+                <a:t>Furkan Karakaya</a:t>
+              </a:r>
+              <a:endParaRPr lang="en-US" sz="6600" noProof="1" smtClean="0"/>
+            </a:p>
+            <a:p>
+              <a:pPr defTabSz="4389438"/>
+              <a:r>
+                <a:rPr lang="tr-TR" sz="4000" i="1" noProof="1" smtClean="0"/>
+                <a:t>(furkan.karakaya</a:t>
+              </a:r>
+              <a:r>
+                <a:rPr lang="en-US" sz="4000" i="1" noProof="1" smtClean="0"/>
+                <a:t>@metu.edu.tr</a:t>
+              </a:r>
+              <a:r>
+                <a:rPr lang="tr-TR" sz="4000" i="1" noProof="1" smtClean="0"/>
+                <a:t>)</a:t>
+              </a:r>
+              <a:endParaRPr lang="en-US" sz="7200" noProof="1"/>
+            </a:p>
+          </p:txBody>
+        </p:sp>
+        <p:pic>
+          <p:nvPicPr>
+            <p:cNvPr id="11" name="Resim 10"/>
+            <p:cNvPicPr>
+              <a:picLocks noChangeAspect="1"/>
+            </p:cNvPicPr>
+            <p:nvPr/>
+          </p:nvPicPr>
+          <p:blipFill>
+            <a:blip r:embed="rId6"/>
+            <a:stretch>
+              <a:fillRect/>
+            </a:stretch>
+          </p:blipFill>
+          <p:spPr>
+            <a:xfrm>
+              <a:off x="9587056" y="4663319"/>
+              <a:ext cx="847105" cy="1446705"/>
+            </a:xfrm>
+            <a:prstGeom prst="rect">
+              <a:avLst/>
+            </a:prstGeom>
+          </p:spPr>
+        </p:pic>
+      </p:grpSp>
       <p:sp>
         <p:nvSpPr>
           <p:cNvPr id="15" name="Metin kutusu 14"/>
@@ -2696,10 +2739,10 @@
         </p:nvGrpSpPr>
         <p:grpSpPr>
           <a:xfrm>
-            <a:off x="663094" y="13558211"/>
-            <a:ext cx="6331912" cy="5695663"/>
+            <a:off x="471530" y="13371544"/>
+            <a:ext cx="7950893" cy="5974905"/>
             <a:chOff x="612742" y="13646553"/>
-            <a:chExt cx="6331912" cy="5695663"/>
+            <a:chExt cx="6812904" cy="5158280"/>
           </a:xfrm>
         </p:grpSpPr>
         <p:pic>
@@ -2734,7 +2777,7 @@
           <p:spPr>
             <a:xfrm>
               <a:off x="1100984" y="18326553"/>
-              <a:ext cx="5843670" cy="1015663"/>
+              <a:ext cx="6324662" cy="478280"/>
             </a:xfrm>
             <a:prstGeom prst="rect">
               <a:avLst/>
@@ -2748,13 +2791,6 @@
             <a:lstStyle/>
             <a:p>
               <a:pPr algn="l"/>
-              <a:r>
-                <a:rPr lang="en-US" sz="3000" dirty="0">
-                  <a:latin typeface="Times New Roman" panose="02020603050405020304" pitchFamily="18" charset="0"/>
-                  <a:cs typeface="Times New Roman" panose="02020603050405020304" pitchFamily="18" charset="0"/>
-                </a:rPr>
-                <a:t>Fig. 1: </a:t>
-              </a:r>
               <a:r>
                 <a:rPr lang="tr-TR" sz="3000" dirty="0" smtClean="0">
                   <a:latin typeface="Times New Roman" panose="02020603050405020304" pitchFamily="18" charset="0"/>
@@ -2802,8 +2838,8 @@
         </p:blipFill>
         <p:spPr>
           <a:xfrm>
-            <a:off x="22832034" y="9772465"/>
-            <a:ext cx="5138999" cy="4320000"/>
+            <a:off x="22705245" y="9330010"/>
+            <a:ext cx="5909849" cy="4968000"/>
           </a:xfrm>
           <a:prstGeom prst="rect">
             <a:avLst/>
@@ -2818,10 +2854,10 @@
         </p:nvGrpSpPr>
         <p:grpSpPr>
           <a:xfrm>
-            <a:off x="1093667" y="19668184"/>
-            <a:ext cx="13229422" cy="5369034"/>
-            <a:chOff x="1274256" y="20198632"/>
-            <a:chExt cx="13229422" cy="5369034"/>
+            <a:off x="1709077" y="19480897"/>
+            <a:ext cx="13680000" cy="5839123"/>
+            <a:chOff x="1952945" y="20198632"/>
+            <a:chExt cx="13229422" cy="5122622"/>
           </a:xfrm>
         </p:grpSpPr>
         <p:sp>
@@ -2832,8 +2868,8 @@
           </p:nvSpPr>
           <p:spPr>
             <a:xfrm>
-              <a:off x="1274256" y="24552003"/>
-              <a:ext cx="13229422" cy="1015663"/>
+              <a:off x="1952945" y="24835235"/>
+              <a:ext cx="13229422" cy="486019"/>
             </a:xfrm>
             <a:prstGeom prst="rect">
               <a:avLst/>
@@ -2848,32 +2884,46 @@
             <a:p>
               <a:pPr algn="l"/>
               <a:r>
-                <a:rPr lang="en-US" sz="3000" dirty="0">
+                <a:rPr lang="tr-TR" sz="3000" dirty="0" smtClean="0">
                   <a:latin typeface="Times New Roman" panose="02020603050405020304" pitchFamily="18" charset="0"/>
                   <a:cs typeface="Times New Roman" panose="02020603050405020304" pitchFamily="18" charset="0"/>
                 </a:rPr>
-                <a:t>Fig. </a:t>
+                <a:t>Parasitic </a:t>
               </a:r>
               <a:r>
                 <a:rPr lang="tr-TR" sz="3000" dirty="0" smtClean="0">
                   <a:latin typeface="Times New Roman" panose="02020603050405020304" pitchFamily="18" charset="0"/>
                   <a:cs typeface="Times New Roman" panose="02020603050405020304" pitchFamily="18" charset="0"/>
                 </a:rPr>
-                <a:t>2</a:t>
-              </a:r>
-              <a:r>
-                <a:rPr lang="en-US" sz="3000" dirty="0" smtClean="0">
-                  <a:latin typeface="Times New Roman" panose="02020603050405020304" pitchFamily="18" charset="0"/>
-                  <a:cs typeface="Times New Roman" panose="02020603050405020304" pitchFamily="18" charset="0"/>
-                </a:rPr>
-                <a:t>:</a:t>
+                <a:t>capacitances vs Drain-Source Voltage plot (a) &amp; </a:t>
               </a:r>
               <a:r>
                 <a:rPr lang="tr-TR" sz="3000" dirty="0" smtClean="0">
                   <a:latin typeface="Times New Roman" panose="02020603050405020304" pitchFamily="18" charset="0"/>
                   <a:cs typeface="Times New Roman" panose="02020603050405020304" pitchFamily="18" charset="0"/>
                 </a:rPr>
-                <a:t> Parasitic capacitances vs Drain-Source Voltage plot (a) &amp; Input Capacitance vs Gate-Source Voltage plot (b)</a:t>
+                <a:t>Ciss </a:t>
+              </a:r>
+              <a:r>
+                <a:rPr lang="tr-TR" sz="3000" dirty="0" smtClean="0">
+                  <a:latin typeface="Times New Roman" panose="02020603050405020304" pitchFamily="18" charset="0"/>
+                  <a:cs typeface="Times New Roman" panose="02020603050405020304" pitchFamily="18" charset="0"/>
+                </a:rPr>
+                <a:t>vs </a:t>
+              </a:r>
+              <a:r>
+                <a:rPr lang="tr-TR" sz="3000" dirty="0" smtClean="0">
+                  <a:latin typeface="Times New Roman" panose="02020603050405020304" pitchFamily="18" charset="0"/>
+                  <a:cs typeface="Times New Roman" panose="02020603050405020304" pitchFamily="18" charset="0"/>
+                </a:rPr>
+                <a:t>Vgs plot </a:t>
+              </a:r>
+              <a:r>
+                <a:rPr lang="tr-TR" sz="3000" dirty="0" smtClean="0">
+                  <a:latin typeface="Times New Roman" panose="02020603050405020304" pitchFamily="18" charset="0"/>
+                  <a:cs typeface="Times New Roman" panose="02020603050405020304" pitchFamily="18" charset="0"/>
+                </a:rPr>
+                <a:t>(b)</a:t>
               </a:r>
               <a:endParaRPr lang="en-US" sz="3000" dirty="0" smtClean="0">
                 <a:latin typeface="Times New Roman" panose="02020603050405020304" pitchFamily="18" charset="0"/>
@@ -2890,10 +2940,10 @@
           </p:nvGrpSpPr>
           <p:grpSpPr>
             <a:xfrm>
-              <a:off x="2029046" y="20226929"/>
-              <a:ext cx="4680000" cy="4430389"/>
-              <a:chOff x="2029046" y="20226929"/>
-              <a:chExt cx="4680000" cy="4430389"/>
+              <a:off x="2029046" y="20226928"/>
+              <a:ext cx="4943626" cy="4786920"/>
+              <a:chOff x="2029046" y="20226928"/>
+              <a:chExt cx="4943626" cy="4786920"/>
             </a:xfrm>
           </p:grpSpPr>
           <p:pic>
@@ -2915,8 +2965,8 @@
             </p:blipFill>
             <p:spPr bwMode="auto">
               <a:xfrm>
-                <a:off x="2029046" y="20226929"/>
-                <a:ext cx="4680000" cy="3960000"/>
+                <a:off x="2029046" y="20226928"/>
+                <a:ext cx="4943626" cy="4358392"/>
               </a:xfrm>
               <a:prstGeom prst="rect">
                 <a:avLst/>
@@ -2940,7 +2990,7 @@
             </p:nvSpPr>
             <p:spPr>
               <a:xfrm>
-                <a:off x="4297912" y="24103320"/>
+                <a:off x="4297912" y="24459850"/>
                 <a:ext cx="694959" cy="553998"/>
               </a:xfrm>
               <a:prstGeom prst="rect">
@@ -2974,10 +3024,10 @@
           </p:nvGrpSpPr>
           <p:grpSpPr>
             <a:xfrm>
-              <a:off x="8329723" y="20198632"/>
-              <a:ext cx="4680000" cy="4427087"/>
-              <a:chOff x="8329723" y="20198632"/>
-              <a:chExt cx="4680000" cy="4427087"/>
+              <a:off x="8329722" y="20198632"/>
+              <a:ext cx="4943627" cy="4810453"/>
+              <a:chOff x="8329722" y="20198632"/>
+              <a:chExt cx="4943627" cy="4810453"/>
             </a:xfrm>
           </p:grpSpPr>
           <p:pic>
@@ -2999,8 +3049,8 @@
             </p:blipFill>
             <p:spPr bwMode="auto">
               <a:xfrm>
-                <a:off x="8329723" y="20198632"/>
-                <a:ext cx="4680000" cy="3960000"/>
+                <a:off x="8329722" y="20198632"/>
+                <a:ext cx="4943627" cy="4358392"/>
               </a:xfrm>
               <a:prstGeom prst="rect">
                 <a:avLst/>
@@ -3024,7 +3074,7 @@
             </p:nvSpPr>
             <p:spPr>
               <a:xfrm>
-                <a:off x="10529118" y="24071721"/>
+                <a:off x="10618799" y="24455087"/>
                 <a:ext cx="694959" cy="553998"/>
               </a:xfrm>
               <a:prstGeom prst="rect">
@@ -3051,39 +3101,6 @@
           </p:sp>
         </p:grpSp>
       </p:grpSp>
-      <p:sp>
-        <p:nvSpPr>
-          <p:cNvPr id="85" name="Metin kutusu 84"/>
-          <p:cNvSpPr txBox="1"/>
-          <p:nvPr/>
-        </p:nvSpPr>
-        <p:spPr>
-          <a:xfrm>
-            <a:off x="865588" y="25079908"/>
-            <a:ext cx="13318773" cy="2308324"/>
-          </a:xfrm>
-          <a:prstGeom prst="rect">
-            <a:avLst/>
-          </a:prstGeom>
-          <a:noFill/>
-        </p:spPr>
-        <p:txBody>
-          <a:bodyPr wrap="square" rtlCol="0">
-            <a:spAutoFit/>
-          </a:bodyPr>
-          <a:lstStyle/>
-          <a:p>
-            <a:pPr algn="just"/>
-            <a:r>
-              <a:rPr lang="en-GB" sz="3600" dirty="0" smtClean="0">
-                <a:latin typeface="Times New Roman" panose="02020603050405020304" pitchFamily="18" charset="0"/>
-                <a:cs typeface="Times New Roman" panose="02020603050405020304" pitchFamily="18" charset="0"/>
-              </a:rPr>
-              <a:t>Even though manufacturer provides the Ciss as constant with respect to drain-source voltage, it changes significantly with varying gate-source voltage. Implementing this feature in the model is important to obtain accurate dynamic/switching characteristics.</a:t>
-            </a:r>
-          </a:p>
-        </p:txBody>
-      </p:sp>
       <p:grpSp>
         <p:nvGrpSpPr>
           <p:cNvPr id="9" name="Group 8"/>
@@ -3092,10 +3109,10 @@
         </p:nvGrpSpPr>
         <p:grpSpPr>
           <a:xfrm>
-            <a:off x="624631" y="27566674"/>
-            <a:ext cx="14075569" cy="4887001"/>
-            <a:chOff x="624631" y="29188998"/>
-            <a:chExt cx="14075569" cy="4887001"/>
+            <a:off x="1642224" y="25748528"/>
+            <a:ext cx="14105574" cy="5834814"/>
+            <a:chOff x="1463515" y="29188997"/>
+            <a:chExt cx="14513449" cy="4659272"/>
           </a:xfrm>
         </p:grpSpPr>
         <p:pic>
@@ -3117,8 +3134,8 @@
           </p:blipFill>
           <p:spPr bwMode="auto">
             <a:xfrm>
-              <a:off x="1848457" y="29188998"/>
-              <a:ext cx="4680000" cy="3960000"/>
+              <a:off x="1848456" y="29188997"/>
+              <a:ext cx="5259818" cy="3967095"/>
             </a:xfrm>
             <a:prstGeom prst="rect">
               <a:avLst/>
@@ -3153,8 +3170,8 @@
           </p:blipFill>
           <p:spPr bwMode="auto">
             <a:xfrm>
-              <a:off x="8149134" y="29188998"/>
-              <a:ext cx="4680000" cy="3960000"/>
+              <a:off x="8149133" y="29188997"/>
+              <a:ext cx="5259818" cy="3967095"/>
             </a:xfrm>
             <a:prstGeom prst="rect">
               <a:avLst/>
@@ -3178,7 +3195,7 @@
           </p:nvSpPr>
           <p:spPr>
             <a:xfrm>
-              <a:off x="3968818" y="33045385"/>
+              <a:off x="4049476" y="33062048"/>
               <a:ext cx="694959" cy="553998"/>
             </a:xfrm>
             <a:prstGeom prst="rect">
@@ -3211,7 +3228,7 @@
           </p:nvSpPr>
           <p:spPr>
             <a:xfrm>
-              <a:off x="10416359" y="33045385"/>
+              <a:off x="10596400" y="33045385"/>
               <a:ext cx="694959" cy="553998"/>
             </a:xfrm>
             <a:prstGeom prst="rect">
@@ -3244,8 +3261,8 @@
           </p:nvSpPr>
           <p:spPr>
             <a:xfrm>
-              <a:off x="624631" y="33522001"/>
-              <a:ext cx="14075569" cy="553998"/>
+              <a:off x="1463515" y="33405885"/>
+              <a:ext cx="14513449" cy="442384"/>
             </a:xfrm>
             <a:prstGeom prst="rect">
               <a:avLst/>
@@ -3260,60 +3277,18 @@
             <a:p>
               <a:pPr algn="l"/>
               <a:r>
-                <a:rPr lang="en-US" sz="3000" dirty="0">
+                <a:rPr lang="tr-TR" sz="3000" dirty="0" smtClean="0">
                   <a:latin typeface="Times New Roman" panose="02020603050405020304" pitchFamily="18" charset="0"/>
                   <a:cs typeface="Times New Roman" panose="02020603050405020304" pitchFamily="18" charset="0"/>
                 </a:rPr>
-                <a:t>Fig. </a:t>
-              </a:r>
-              <a:r>
-                <a:rPr lang="tr-TR" sz="3000" dirty="0">
-                  <a:latin typeface="Times New Roman" panose="02020603050405020304" pitchFamily="18" charset="0"/>
-                  <a:cs typeface="Times New Roman" panose="02020603050405020304" pitchFamily="18" charset="0"/>
-                </a:rPr>
-                <a:t>3</a:t>
-              </a:r>
-              <a:r>
-                <a:rPr lang="en-US" sz="3000" dirty="0" smtClean="0">
-                  <a:latin typeface="Times New Roman" panose="02020603050405020304" pitchFamily="18" charset="0"/>
-                  <a:cs typeface="Times New Roman" panose="02020603050405020304" pitchFamily="18" charset="0"/>
-                </a:rPr>
-                <a:t>:</a:t>
+                <a:t>Static </a:t>
               </a:r>
               <a:r>
                 <a:rPr lang="tr-TR" sz="3000" dirty="0" smtClean="0">
                   <a:latin typeface="Times New Roman" panose="02020603050405020304" pitchFamily="18" charset="0"/>
                   <a:cs typeface="Times New Roman" panose="02020603050405020304" pitchFamily="18" charset="0"/>
                 </a:rPr>
-                <a:t> </a:t>
-              </a:r>
-              <a:r>
-                <a:rPr lang="tr-TR" sz="3000" dirty="0" err="1" smtClean="0">
-                  <a:latin typeface="Times New Roman" panose="02020603050405020304" pitchFamily="18" charset="0"/>
-                  <a:cs typeface="Times New Roman" panose="02020603050405020304" pitchFamily="18" charset="0"/>
-                </a:rPr>
-                <a:t>Static</a:t>
-              </a:r>
-              <a:r>
-                <a:rPr lang="tr-TR" sz="3000" dirty="0" smtClean="0">
-                  <a:latin typeface="Times New Roman" panose="02020603050405020304" pitchFamily="18" charset="0"/>
-                  <a:cs typeface="Times New Roman" panose="02020603050405020304" pitchFamily="18" charset="0"/>
-                </a:rPr>
-                <a:t> </a:t>
-              </a:r>
-              <a:r>
-                <a:rPr lang="tr-TR" sz="3000" dirty="0" err="1" smtClean="0">
-                  <a:latin typeface="Times New Roman" panose="02020603050405020304" pitchFamily="18" charset="0"/>
-                  <a:cs typeface="Times New Roman" panose="02020603050405020304" pitchFamily="18" charset="0"/>
-                </a:rPr>
-                <a:t>Results</a:t>
-              </a:r>
-              <a:r>
-                <a:rPr lang="tr-TR" sz="3000" dirty="0" smtClean="0">
-                  <a:latin typeface="Times New Roman" panose="02020603050405020304" pitchFamily="18" charset="0"/>
-                  <a:cs typeface="Times New Roman" panose="02020603050405020304" pitchFamily="18" charset="0"/>
-                </a:rPr>
-                <a:t> of </a:t>
+                <a:t>Results of </a:t>
               </a:r>
               <a:r>
                 <a:rPr lang="tr-TR" sz="3000" dirty="0">
@@ -3327,77 +3302,7 @@
                   <a:latin typeface="Times New Roman" panose="02020603050405020304" pitchFamily="18" charset="0"/>
                   <a:cs typeface="Times New Roman" panose="02020603050405020304" pitchFamily="18" charset="0"/>
                 </a:rPr>
-                <a:t> </a:t>
-              </a:r>
-              <a:r>
-                <a:rPr lang="tr-TR" sz="3000" dirty="0" err="1" smtClean="0">
-                  <a:latin typeface="Times New Roman" panose="02020603050405020304" pitchFamily="18" charset="0"/>
-                  <a:cs typeface="Times New Roman" panose="02020603050405020304" pitchFamily="18" charset="0"/>
-                </a:rPr>
-                <a:t>for</a:t>
-              </a:r>
-              <a:r>
-                <a:rPr lang="tr-TR" sz="3000" dirty="0" smtClean="0">
-                  <a:latin typeface="Times New Roman" panose="02020603050405020304" pitchFamily="18" charset="0"/>
-                  <a:cs typeface="Times New Roman" panose="02020603050405020304" pitchFamily="18" charset="0"/>
-                </a:rPr>
-                <a:t> </a:t>
-              </a:r>
-              <a:r>
-                <a:rPr lang="tr-TR" sz="3000" dirty="0" err="1" smtClean="0">
-                  <a:latin typeface="Times New Roman" panose="02020603050405020304" pitchFamily="18" charset="0"/>
-                  <a:cs typeface="Times New Roman" panose="02020603050405020304" pitchFamily="18" charset="0"/>
-                </a:rPr>
-                <a:t>Forward</a:t>
-              </a:r>
-              <a:r>
-                <a:rPr lang="tr-TR" sz="3000" dirty="0" smtClean="0">
-                  <a:latin typeface="Times New Roman" panose="02020603050405020304" pitchFamily="18" charset="0"/>
-                  <a:cs typeface="Times New Roman" panose="02020603050405020304" pitchFamily="18" charset="0"/>
-                </a:rPr>
-                <a:t> </a:t>
-              </a:r>
-              <a:r>
-                <a:rPr lang="tr-TR" sz="3000" dirty="0" err="1" smtClean="0">
-                  <a:latin typeface="Times New Roman" panose="02020603050405020304" pitchFamily="18" charset="0"/>
-                  <a:cs typeface="Times New Roman" panose="02020603050405020304" pitchFamily="18" charset="0"/>
-                </a:rPr>
-                <a:t>Conduction</a:t>
-              </a:r>
-              <a:r>
-                <a:rPr lang="tr-TR" sz="3000" dirty="0" smtClean="0">
-                  <a:latin typeface="Times New Roman" panose="02020603050405020304" pitchFamily="18" charset="0"/>
-                  <a:cs typeface="Times New Roman" panose="02020603050405020304" pitchFamily="18" charset="0"/>
-                </a:rPr>
-                <a:t> (a) &amp; </a:t>
-              </a:r>
-              <a:r>
-                <a:rPr lang="tr-TR" sz="3000" dirty="0" err="1" smtClean="0">
-                  <a:latin typeface="Times New Roman" panose="02020603050405020304" pitchFamily="18" charset="0"/>
-                  <a:cs typeface="Times New Roman" panose="02020603050405020304" pitchFamily="18" charset="0"/>
-                </a:rPr>
-                <a:t>Reverse</a:t>
-              </a:r>
-              <a:r>
-                <a:rPr lang="tr-TR" sz="3000" dirty="0" smtClean="0">
-                  <a:latin typeface="Times New Roman" panose="02020603050405020304" pitchFamily="18" charset="0"/>
-                  <a:cs typeface="Times New Roman" panose="02020603050405020304" pitchFamily="18" charset="0"/>
-                </a:rPr>
-                <a:t> </a:t>
-              </a:r>
-              <a:r>
-                <a:rPr lang="tr-TR" sz="3000" dirty="0" err="1" smtClean="0">
-                  <a:latin typeface="Times New Roman" panose="02020603050405020304" pitchFamily="18" charset="0"/>
-                  <a:cs typeface="Times New Roman" panose="02020603050405020304" pitchFamily="18" charset="0"/>
-                </a:rPr>
-                <a:t>Conduction</a:t>
-              </a:r>
-              <a:r>
-                <a:rPr lang="tr-TR" sz="3000" dirty="0" smtClean="0">
-                  <a:latin typeface="Times New Roman" panose="02020603050405020304" pitchFamily="18" charset="0"/>
-                  <a:cs typeface="Times New Roman" panose="02020603050405020304" pitchFamily="18" charset="0"/>
-                </a:rPr>
-                <a:t> (b)</a:t>
+                <a:t> for Forward Conduction (a) &amp; Reverse Conduction (b)</a:t>
               </a:r>
               <a:endParaRPr lang="en-US" sz="3000" dirty="0" smtClean="0">
                 <a:latin typeface="Times New Roman" panose="02020603050405020304" pitchFamily="18" charset="0"/>
@@ -3415,8 +3320,8 @@
         </p:nvSpPr>
         <p:spPr>
           <a:xfrm>
-            <a:off x="855838" y="32609359"/>
-            <a:ext cx="13318773" cy="2862322"/>
+            <a:off x="1082387" y="32095201"/>
+            <a:ext cx="13318773" cy="2308324"/>
           </a:xfrm>
           <a:prstGeom prst="rect">
             <a:avLst/>
@@ -3431,42 +3336,42 @@
           <a:p>
             <a:pPr algn="just"/>
             <a:r>
-              <a:rPr lang="tr-TR" sz="3600" dirty="0">
-                <a:latin typeface="Times New Roman" panose="02020603050405020304" pitchFamily="18" charset="0"/>
-                <a:cs typeface="Times New Roman" panose="02020603050405020304" pitchFamily="18" charset="0"/>
-              </a:rPr>
-              <a:t>T</a:t>
+              <a:rPr lang="tr-TR" sz="3600" b="1" dirty="0" smtClean="0">
+                <a:latin typeface="Times New Roman" panose="02020603050405020304" pitchFamily="18" charset="0"/>
+                <a:cs typeface="Times New Roman" panose="02020603050405020304" pitchFamily="18" charset="0"/>
+              </a:rPr>
+              <a:t>A </a:t>
+            </a:r>
+            <a:r>
+              <a:rPr lang="tr-TR" sz="3600" b="1" dirty="0" smtClean="0">
+                <a:latin typeface="Times New Roman" panose="02020603050405020304" pitchFamily="18" charset="0"/>
+                <a:cs typeface="Times New Roman" panose="02020603050405020304" pitchFamily="18" charset="0"/>
+              </a:rPr>
+              <a:t>negative gate bias increases the reverse conduction loss</a:t>
+            </a:r>
+            <a:r>
+              <a:rPr lang="tr-TR" sz="3600" dirty="0" smtClean="0">
+                <a:latin typeface="Times New Roman" panose="02020603050405020304" pitchFamily="18" charset="0"/>
+                <a:cs typeface="Times New Roman" panose="02020603050405020304" pitchFamily="18" charset="0"/>
+              </a:rPr>
+              <a:t>. </a:t>
+            </a:r>
+            <a:r>
+              <a:rPr lang="tr-TR" sz="3600" dirty="0" err="1" smtClean="0">
+                <a:latin typeface="Times New Roman" panose="02020603050405020304" pitchFamily="18" charset="0"/>
+                <a:cs typeface="Times New Roman" panose="02020603050405020304" pitchFamily="18" charset="0"/>
+              </a:rPr>
+              <a:t>Therefore</a:t>
             </a:r>
             <a:r>
               <a:rPr lang="en-GB" sz="3600" dirty="0" smtClean="0">
                 <a:latin typeface="Times New Roman" panose="02020603050405020304" pitchFamily="18" charset="0"/>
                 <a:cs typeface="Times New Roman" panose="02020603050405020304" pitchFamily="18" charset="0"/>
               </a:rPr>
-              <a:t>he </a:t>
-            </a:r>
-            <a:r>
-              <a:rPr lang="en-GB" sz="3600" dirty="0">
-                <a:latin typeface="Times New Roman" panose="02020603050405020304" pitchFamily="18" charset="0"/>
-                <a:cs typeface="Times New Roman" panose="02020603050405020304" pitchFamily="18" charset="0"/>
-              </a:rPr>
-              <a:t>reverse conduction </a:t>
-            </a:r>
-            <a:r>
-              <a:rPr lang="en-GB" sz="3600" dirty="0" smtClean="0">
-                <a:latin typeface="Times New Roman" panose="02020603050405020304" pitchFamily="18" charset="0"/>
-                <a:cs typeface="Times New Roman" panose="02020603050405020304" pitchFamily="18" charset="0"/>
-              </a:rPr>
-              <a:t>behaviour </a:t>
-            </a:r>
-            <a:r>
-              <a:rPr lang="en-GB" sz="3600" dirty="0">
-                <a:latin typeface="Times New Roman" panose="02020603050405020304" pitchFamily="18" charset="0"/>
-                <a:cs typeface="Times New Roman" panose="02020603050405020304" pitchFamily="18" charset="0"/>
-              </a:rPr>
-              <a:t>is highly dependent on </a:t>
-            </a:r>
-            <a:r>
-              <a:rPr lang="en-GB" sz="3600" dirty="0" smtClean="0">
+              <a:t>, </a:t>
+            </a:r>
+            <a:r>
+              <a:rPr lang="tr-TR" sz="3600" dirty="0" err="1" smtClean="0">
                 <a:latin typeface="Times New Roman" panose="02020603050405020304" pitchFamily="18" charset="0"/>
                 <a:cs typeface="Times New Roman" panose="02020603050405020304" pitchFamily="18" charset="0"/>
               </a:rPr>
@@ -3480,39 +3385,39 @@
               <a:t> </a:t>
             </a:r>
             <a:r>
-              <a:rPr lang="en-GB" sz="3600" dirty="0" smtClean="0">
-                <a:latin typeface="Times New Roman" panose="02020603050405020304" pitchFamily="18" charset="0"/>
-                <a:cs typeface="Times New Roman" panose="02020603050405020304" pitchFamily="18" charset="0"/>
-              </a:rPr>
-              <a:t>applied </a:t>
-            </a:r>
-            <a:r>
-              <a:rPr lang="en-GB" sz="3600" dirty="0">
-                <a:latin typeface="Times New Roman" panose="02020603050405020304" pitchFamily="18" charset="0"/>
-                <a:cs typeface="Times New Roman" panose="02020603050405020304" pitchFamily="18" charset="0"/>
-              </a:rPr>
-              <a:t>gate </a:t>
-            </a:r>
-            <a:r>
-              <a:rPr lang="en-GB" sz="3600" dirty="0" smtClean="0">
-                <a:latin typeface="Times New Roman" panose="02020603050405020304" pitchFamily="18" charset="0"/>
-                <a:cs typeface="Times New Roman" panose="02020603050405020304" pitchFamily="18" charset="0"/>
-              </a:rPr>
-              <a:t>voltage. </a:t>
+              <a:rPr lang="tr-TR" sz="3600" dirty="0" err="1" smtClean="0">
+                <a:latin typeface="Times New Roman" panose="02020603050405020304" pitchFamily="18" charset="0"/>
+                <a:cs typeface="Times New Roman" panose="02020603050405020304" pitchFamily="18" charset="0"/>
+              </a:rPr>
+              <a:t>negative</a:t>
+            </a:r>
+            <a:r>
+              <a:rPr lang="tr-TR" sz="3600" dirty="0" smtClean="0">
+                <a:latin typeface="Times New Roman" panose="02020603050405020304" pitchFamily="18" charset="0"/>
+                <a:cs typeface="Times New Roman" panose="02020603050405020304" pitchFamily="18" charset="0"/>
+              </a:rPr>
+              <a:t> </a:t>
+            </a:r>
+            <a:r>
+              <a:rPr lang="tr-TR" sz="3600" b="1" dirty="0" err="1" smtClean="0">
+                <a:latin typeface="Times New Roman" panose="02020603050405020304" pitchFamily="18" charset="0"/>
+                <a:cs typeface="Times New Roman" panose="02020603050405020304" pitchFamily="18" charset="0"/>
+              </a:rPr>
+              <a:t>gate</a:t>
             </a:r>
             <a:r>
               <a:rPr lang="tr-TR" sz="3600" b="1" dirty="0" smtClean="0">
                 <a:latin typeface="Times New Roman" panose="02020603050405020304" pitchFamily="18" charset="0"/>
                 <a:cs typeface="Times New Roman" panose="02020603050405020304" pitchFamily="18" charset="0"/>
               </a:rPr>
-              <a:t>A </a:t>
+              <a:t> </a:t>
             </a:r>
             <a:r>
               <a:rPr lang="tr-TR" sz="3600" b="1" dirty="0" err="1" smtClean="0">
                 <a:latin typeface="Times New Roman" panose="02020603050405020304" pitchFamily="18" charset="0"/>
                 <a:cs typeface="Times New Roman" panose="02020603050405020304" pitchFamily="18" charset="0"/>
               </a:rPr>
-              <a:t>negative</a:t>
+              <a:t>bias</a:t>
             </a:r>
             <a:r>
               <a:rPr lang="tr-TR" sz="3600" b="1" dirty="0" smtClean="0">
@@ -3526,7 +3431,7 @@
                 <a:latin typeface="Times New Roman" panose="02020603050405020304" pitchFamily="18" charset="0"/>
                 <a:cs typeface="Times New Roman" panose="02020603050405020304" pitchFamily="18" charset="0"/>
               </a:rPr>
-              <a:t>gate</a:t>
+              <a:t>level</a:t>
             </a:r>
             <a:r>
               <a:rPr lang="tr-TR" sz="3600" b="1" dirty="0" smtClean="0">
@@ -3536,217 +3441,56 @@
               <a:t> </a:t>
             </a:r>
             <a:r>
+              <a:rPr lang="tr-TR" sz="3600" dirty="0" err="1" smtClean="0">
+                <a:latin typeface="Times New Roman" panose="02020603050405020304" pitchFamily="18" charset="0"/>
+                <a:cs typeface="Times New Roman" panose="02020603050405020304" pitchFamily="18" charset="0"/>
+              </a:rPr>
+              <a:t>and</a:t>
+            </a:r>
+            <a:r>
+              <a:rPr lang="tr-TR" sz="3600" dirty="0" smtClean="0">
+                <a:latin typeface="Times New Roman" panose="02020603050405020304" pitchFamily="18" charset="0"/>
+                <a:cs typeface="Times New Roman" panose="02020603050405020304" pitchFamily="18" charset="0"/>
+              </a:rPr>
+              <a:t> </a:t>
+            </a:r>
+            <a:r>
               <a:rPr lang="tr-TR" sz="3600" b="1" dirty="0" err="1" smtClean="0">
                 <a:latin typeface="Times New Roman" panose="02020603050405020304" pitchFamily="18" charset="0"/>
                 <a:cs typeface="Times New Roman" panose="02020603050405020304" pitchFamily="18" charset="0"/>
               </a:rPr>
-              <a:t>bias</a:t>
+              <a:t>dead</a:t>
             </a:r>
             <a:r>
               <a:rPr lang="tr-TR" sz="3600" b="1" dirty="0" smtClean="0">
                 <a:latin typeface="Times New Roman" panose="02020603050405020304" pitchFamily="18" charset="0"/>
                 <a:cs typeface="Times New Roman" panose="02020603050405020304" pitchFamily="18" charset="0"/>
               </a:rPr>
+              <a:t>-time</a:t>
+            </a:r>
+            <a:r>
+              <a:rPr lang="tr-TR" sz="3600" dirty="0" smtClean="0">
+                <a:latin typeface="Times New Roman" panose="02020603050405020304" pitchFamily="18" charset="0"/>
+                <a:cs typeface="Times New Roman" panose="02020603050405020304" pitchFamily="18" charset="0"/>
+              </a:rPr>
               <a:t> </a:t>
             </a:r>
             <a:r>
+              <a:rPr lang="tr-TR" sz="3600" dirty="0" err="1" smtClean="0">
+                <a:latin typeface="Times New Roman" panose="02020603050405020304" pitchFamily="18" charset="0"/>
+                <a:cs typeface="Times New Roman" panose="02020603050405020304" pitchFamily="18" charset="0"/>
+              </a:rPr>
+              <a:t>duration</a:t>
+            </a:r>
+            <a:r>
+              <a:rPr lang="tr-TR" sz="3600" dirty="0" smtClean="0">
+                <a:latin typeface="Times New Roman" panose="02020603050405020304" pitchFamily="18" charset="0"/>
+                <a:cs typeface="Times New Roman" panose="02020603050405020304" pitchFamily="18" charset="0"/>
+              </a:rPr>
+              <a:t> </a:t>
+            </a:r>
+            <a:r>
               <a:rPr lang="tr-TR" sz="3600" b="1" dirty="0" err="1" smtClean="0">
-                <a:latin typeface="Times New Roman" panose="02020603050405020304" pitchFamily="18" charset="0"/>
-                <a:cs typeface="Times New Roman" panose="02020603050405020304" pitchFamily="18" charset="0"/>
-              </a:rPr>
-              <a:t>increases</a:t>
-            </a:r>
-            <a:r>
-              <a:rPr lang="tr-TR" sz="3600" b="1" dirty="0" smtClean="0">
-                <a:latin typeface="Times New Roman" panose="02020603050405020304" pitchFamily="18" charset="0"/>
-                <a:cs typeface="Times New Roman" panose="02020603050405020304" pitchFamily="18" charset="0"/>
-              </a:rPr>
-              <a:t> </a:t>
-            </a:r>
-            <a:r>
-              <a:rPr lang="tr-TR" sz="3600" b="1" dirty="0" err="1" smtClean="0">
-                <a:latin typeface="Times New Roman" panose="02020603050405020304" pitchFamily="18" charset="0"/>
-                <a:cs typeface="Times New Roman" panose="02020603050405020304" pitchFamily="18" charset="0"/>
-              </a:rPr>
-              <a:t>the</a:t>
-            </a:r>
-            <a:r>
-              <a:rPr lang="tr-TR" sz="3600" b="1" dirty="0" smtClean="0">
-                <a:latin typeface="Times New Roman" panose="02020603050405020304" pitchFamily="18" charset="0"/>
-                <a:cs typeface="Times New Roman" panose="02020603050405020304" pitchFamily="18" charset="0"/>
-              </a:rPr>
-              <a:t> </a:t>
-            </a:r>
-            <a:r>
-              <a:rPr lang="tr-TR" sz="3600" b="1" dirty="0" err="1" smtClean="0">
-                <a:latin typeface="Times New Roman" panose="02020603050405020304" pitchFamily="18" charset="0"/>
-                <a:cs typeface="Times New Roman" panose="02020603050405020304" pitchFamily="18" charset="0"/>
-              </a:rPr>
-              <a:t>reverse</a:t>
-            </a:r>
-            <a:r>
-              <a:rPr lang="tr-TR" sz="3600" b="1" dirty="0" smtClean="0">
-                <a:latin typeface="Times New Roman" panose="02020603050405020304" pitchFamily="18" charset="0"/>
-                <a:cs typeface="Times New Roman" panose="02020603050405020304" pitchFamily="18" charset="0"/>
-              </a:rPr>
-              <a:t> </a:t>
-            </a:r>
-            <a:r>
-              <a:rPr lang="tr-TR" sz="3600" b="1" dirty="0" err="1" smtClean="0">
-                <a:latin typeface="Times New Roman" panose="02020603050405020304" pitchFamily="18" charset="0"/>
-                <a:cs typeface="Times New Roman" panose="02020603050405020304" pitchFamily="18" charset="0"/>
-              </a:rPr>
-              <a:t>conduction</a:t>
-            </a:r>
-            <a:r>
-              <a:rPr lang="tr-TR" sz="3600" b="1" dirty="0" smtClean="0">
-                <a:latin typeface="Times New Roman" panose="02020603050405020304" pitchFamily="18" charset="0"/>
-                <a:cs typeface="Times New Roman" panose="02020603050405020304" pitchFamily="18" charset="0"/>
-              </a:rPr>
-              <a:t> </a:t>
-            </a:r>
-            <a:r>
-              <a:rPr lang="tr-TR" sz="3600" b="1" dirty="0" err="1" smtClean="0">
-                <a:latin typeface="Times New Roman" panose="02020603050405020304" pitchFamily="18" charset="0"/>
-                <a:cs typeface="Times New Roman" panose="02020603050405020304" pitchFamily="18" charset="0"/>
-              </a:rPr>
-              <a:t>loss</a:t>
-            </a:r>
-            <a:r>
-              <a:rPr lang="tr-TR" sz="3600" dirty="0" smtClean="0">
-                <a:latin typeface="Times New Roman" panose="02020603050405020304" pitchFamily="18" charset="0"/>
-                <a:cs typeface="Times New Roman" panose="02020603050405020304" pitchFamily="18" charset="0"/>
-              </a:rPr>
-              <a:t>. </a:t>
-            </a:r>
-            <a:r>
-              <a:rPr lang="tr-TR" sz="3600" dirty="0" err="1" smtClean="0">
-                <a:latin typeface="Times New Roman" panose="02020603050405020304" pitchFamily="18" charset="0"/>
-                <a:cs typeface="Times New Roman" panose="02020603050405020304" pitchFamily="18" charset="0"/>
-              </a:rPr>
-              <a:t>Therefore</a:t>
-            </a:r>
-            <a:r>
-              <a:rPr lang="en-GB" sz="3600" dirty="0" smtClean="0">
-                <a:latin typeface="Times New Roman" panose="02020603050405020304" pitchFamily="18" charset="0"/>
-                <a:cs typeface="Times New Roman" panose="02020603050405020304" pitchFamily="18" charset="0"/>
-              </a:rPr>
-              <a:t>, </a:t>
-            </a:r>
-            <a:r>
-              <a:rPr lang="tr-TR" sz="3600" dirty="0" err="1" smtClean="0">
-                <a:latin typeface="Times New Roman" panose="02020603050405020304" pitchFamily="18" charset="0"/>
-                <a:cs typeface="Times New Roman" panose="02020603050405020304" pitchFamily="18" charset="0"/>
-              </a:rPr>
-              <a:t>the</a:t>
-            </a:r>
-            <a:r>
-              <a:rPr lang="tr-TR" sz="3600" dirty="0" smtClean="0">
-                <a:latin typeface="Times New Roman" panose="02020603050405020304" pitchFamily="18" charset="0"/>
-                <a:cs typeface="Times New Roman" panose="02020603050405020304" pitchFamily="18" charset="0"/>
-              </a:rPr>
-              <a:t> </a:t>
-            </a:r>
-            <a:r>
-              <a:rPr lang="tr-TR" sz="3600" dirty="0" err="1" smtClean="0">
-                <a:latin typeface="Times New Roman" panose="02020603050405020304" pitchFamily="18" charset="0"/>
-                <a:cs typeface="Times New Roman" panose="02020603050405020304" pitchFamily="18" charset="0"/>
-              </a:rPr>
-              <a:t>negative</a:t>
-            </a:r>
-            <a:r>
-              <a:rPr lang="tr-TR" sz="3600" dirty="0" smtClean="0">
-                <a:latin typeface="Times New Roman" panose="02020603050405020304" pitchFamily="18" charset="0"/>
-                <a:cs typeface="Times New Roman" panose="02020603050405020304" pitchFamily="18" charset="0"/>
-              </a:rPr>
-              <a:t> </a:t>
-            </a:r>
-            <a:r>
-              <a:rPr lang="tr-TR" sz="3600" dirty="0" err="1" smtClean="0">
-                <a:latin typeface="Times New Roman" panose="02020603050405020304" pitchFamily="18" charset="0"/>
-                <a:cs typeface="Times New Roman" panose="02020603050405020304" pitchFamily="18" charset="0"/>
-              </a:rPr>
-              <a:t>gate</a:t>
-            </a:r>
-            <a:r>
-              <a:rPr lang="tr-TR" sz="3600" dirty="0" smtClean="0">
-                <a:latin typeface="Times New Roman" panose="02020603050405020304" pitchFamily="18" charset="0"/>
-                <a:cs typeface="Times New Roman" panose="02020603050405020304" pitchFamily="18" charset="0"/>
-              </a:rPr>
-              <a:t> </a:t>
-            </a:r>
-            <a:r>
-              <a:rPr lang="tr-TR" sz="3600" dirty="0" err="1" smtClean="0">
-                <a:latin typeface="Times New Roman" panose="02020603050405020304" pitchFamily="18" charset="0"/>
-                <a:cs typeface="Times New Roman" panose="02020603050405020304" pitchFamily="18" charset="0"/>
-              </a:rPr>
-              <a:t>bias</a:t>
-            </a:r>
-            <a:r>
-              <a:rPr lang="tr-TR" sz="3600" dirty="0" smtClean="0">
-                <a:latin typeface="Times New Roman" panose="02020603050405020304" pitchFamily="18" charset="0"/>
-                <a:cs typeface="Times New Roman" panose="02020603050405020304" pitchFamily="18" charset="0"/>
-              </a:rPr>
-              <a:t> </a:t>
-            </a:r>
-            <a:r>
-              <a:rPr lang="tr-TR" sz="3600" dirty="0" err="1" smtClean="0">
-                <a:latin typeface="Times New Roman" panose="02020603050405020304" pitchFamily="18" charset="0"/>
-                <a:cs typeface="Times New Roman" panose="02020603050405020304" pitchFamily="18" charset="0"/>
-              </a:rPr>
-              <a:t>level</a:t>
-            </a:r>
-            <a:r>
-              <a:rPr lang="tr-TR" sz="3600" dirty="0" smtClean="0">
-                <a:latin typeface="Times New Roman" panose="02020603050405020304" pitchFamily="18" charset="0"/>
-                <a:cs typeface="Times New Roman" panose="02020603050405020304" pitchFamily="18" charset="0"/>
-              </a:rPr>
-              <a:t> </a:t>
-            </a:r>
-            <a:r>
-              <a:rPr lang="tr-TR" sz="3600" dirty="0" err="1" smtClean="0">
-                <a:latin typeface="Times New Roman" panose="02020603050405020304" pitchFamily="18" charset="0"/>
-                <a:cs typeface="Times New Roman" panose="02020603050405020304" pitchFamily="18" charset="0"/>
-              </a:rPr>
-              <a:t>and</a:t>
-            </a:r>
-            <a:r>
-              <a:rPr lang="tr-TR" sz="3600" dirty="0" smtClean="0">
-                <a:latin typeface="Times New Roman" panose="02020603050405020304" pitchFamily="18" charset="0"/>
-                <a:cs typeface="Times New Roman" panose="02020603050405020304" pitchFamily="18" charset="0"/>
-              </a:rPr>
-              <a:t> </a:t>
-            </a:r>
-            <a:r>
-              <a:rPr lang="tr-TR" sz="3600" dirty="0" err="1" smtClean="0">
-                <a:latin typeface="Times New Roman" panose="02020603050405020304" pitchFamily="18" charset="0"/>
-                <a:cs typeface="Times New Roman" panose="02020603050405020304" pitchFamily="18" charset="0"/>
-              </a:rPr>
-              <a:t>dead</a:t>
-            </a:r>
-            <a:r>
-              <a:rPr lang="tr-TR" sz="3600" dirty="0" smtClean="0">
-                <a:latin typeface="Times New Roman" panose="02020603050405020304" pitchFamily="18" charset="0"/>
-                <a:cs typeface="Times New Roman" panose="02020603050405020304" pitchFamily="18" charset="0"/>
-              </a:rPr>
-              <a:t>-time </a:t>
-            </a:r>
-            <a:r>
-              <a:rPr lang="tr-TR" sz="3600" dirty="0" err="1" smtClean="0">
-                <a:latin typeface="Times New Roman" panose="02020603050405020304" pitchFamily="18" charset="0"/>
-                <a:cs typeface="Times New Roman" panose="02020603050405020304" pitchFamily="18" charset="0"/>
-              </a:rPr>
-              <a:t>duration</a:t>
-            </a:r>
-            <a:r>
-              <a:rPr lang="tr-TR" sz="3600" dirty="0" smtClean="0">
-                <a:latin typeface="Times New Roman" panose="02020603050405020304" pitchFamily="18" charset="0"/>
-                <a:cs typeface="Times New Roman" panose="02020603050405020304" pitchFamily="18" charset="0"/>
-              </a:rPr>
-              <a:t> </a:t>
-            </a:r>
-            <a:r>
-              <a:rPr lang="tr-TR" sz="3600" dirty="0" err="1" smtClean="0">
                 <a:latin typeface="Times New Roman" panose="02020603050405020304" pitchFamily="18" charset="0"/>
                 <a:cs typeface="Times New Roman" panose="02020603050405020304" pitchFamily="18" charset="0"/>
               </a:rPr>
@@ -3868,8 +3612,8 @@
         </p:nvSpPr>
         <p:spPr>
           <a:xfrm>
-            <a:off x="6990062" y="13646553"/>
-            <a:ext cx="7551420" cy="5078313"/>
+            <a:off x="7938150" y="14779176"/>
+            <a:ext cx="6807771" cy="3416320"/>
           </a:xfrm>
           <a:prstGeom prst="rect">
             <a:avLst/>
@@ -3887,11 +3631,25 @@
               <a:buChar char="§"/>
             </a:pPr>
             <a:r>
+              <a:rPr lang="en-GB" sz="3600" b="1" dirty="0" smtClean="0">
+                <a:latin typeface="Times New Roman" panose="02020603050405020304" pitchFamily="18" charset="0"/>
+                <a:cs typeface="Times New Roman" panose="02020603050405020304" pitchFamily="18" charset="0"/>
+              </a:rPr>
+              <a:t>Blue branch </a:t>
+            </a:r>
+            <a:r>
               <a:rPr lang="en-GB" sz="3600" dirty="0" smtClean="0">
                 <a:latin typeface="Times New Roman" panose="02020603050405020304" pitchFamily="18" charset="0"/>
                 <a:cs typeface="Times New Roman" panose="02020603050405020304" pitchFamily="18" charset="0"/>
               </a:rPr>
-              <a:t>Blue branch indicates the device channel</a:t>
+              <a:t>indicates the </a:t>
+            </a:r>
+            <a:r>
+              <a:rPr lang="en-GB" sz="3600" b="1" dirty="0" smtClean="0">
+                <a:latin typeface="Times New Roman" panose="02020603050405020304" pitchFamily="18" charset="0"/>
+                <a:cs typeface="Times New Roman" panose="02020603050405020304" pitchFamily="18" charset="0"/>
+              </a:rPr>
+              <a:t>device channel</a:t>
             </a:r>
           </a:p>
           <a:p>
@@ -3904,7 +3662,35 @@
                 <a:latin typeface="Times New Roman" panose="02020603050405020304" pitchFamily="18" charset="0"/>
                 <a:cs typeface="Times New Roman" panose="02020603050405020304" pitchFamily="18" charset="0"/>
               </a:rPr>
-              <a:t>The parasitic capacitances are highly dependent on the electrical field between</a:t>
+              <a:t>The </a:t>
+            </a:r>
+            <a:r>
+              <a:rPr lang="en-GB" sz="3600" b="1" dirty="0" smtClean="0">
+                <a:latin typeface="Times New Roman" panose="02020603050405020304" pitchFamily="18" charset="0"/>
+                <a:cs typeface="Times New Roman" panose="02020603050405020304" pitchFamily="18" charset="0"/>
+              </a:rPr>
+              <a:t>parasitic capacitances </a:t>
+            </a:r>
+            <a:r>
+              <a:rPr lang="en-GB" sz="3600" dirty="0" smtClean="0">
+                <a:latin typeface="Times New Roman" panose="02020603050405020304" pitchFamily="18" charset="0"/>
+                <a:cs typeface="Times New Roman" panose="02020603050405020304" pitchFamily="18" charset="0"/>
+              </a:rPr>
+              <a:t>are highly </a:t>
+            </a:r>
+            <a:r>
+              <a:rPr lang="en-GB" sz="3600" b="1" dirty="0" smtClean="0">
+                <a:latin typeface="Times New Roman" panose="02020603050405020304" pitchFamily="18" charset="0"/>
+                <a:cs typeface="Times New Roman" panose="02020603050405020304" pitchFamily="18" charset="0"/>
+              </a:rPr>
+              <a:t>dependent on the electrical field</a:t>
+            </a:r>
+            <a:r>
+              <a:rPr lang="en-GB" sz="3600" dirty="0" smtClean="0">
+                <a:latin typeface="Times New Roman" panose="02020603050405020304" pitchFamily="18" charset="0"/>
+                <a:cs typeface="Times New Roman" panose="02020603050405020304" pitchFamily="18" charset="0"/>
+              </a:rPr>
+              <a:t> between</a:t>
             </a:r>
             <a:r>
               <a:rPr lang="tr-TR" sz="3600" dirty="0" smtClean="0">
@@ -3918,21 +3704,19 @@
                 <a:latin typeface="Times New Roman" panose="02020603050405020304" pitchFamily="18" charset="0"/>
                 <a:cs typeface="Times New Roman" panose="02020603050405020304" pitchFamily="18" charset="0"/>
               </a:rPr>
-              <a:t>drain-source terminals.</a:t>
-            </a:r>
-          </a:p>
-          <a:p>
-            <a:pPr marL="571500" indent="-571500" algn="l">
-              <a:buFont typeface="Wingdings" panose="05000000000000000000" pitchFamily="2" charset="2"/>
-              <a:buChar char="§"/>
-            </a:pPr>
+              <a:t>drain-source terminals</a:t>
+            </a:r>
             <a:r>
               <a:rPr lang="en-GB" sz="3600" dirty="0" smtClean="0">
                 <a:latin typeface="Times New Roman" panose="02020603050405020304" pitchFamily="18" charset="0"/>
                 <a:cs typeface="Times New Roman" panose="02020603050405020304" pitchFamily="18" charset="0"/>
               </a:rPr>
-              <a:t>Kelvin Source (SS) pin is used to eliminate Common Source Inductance (CSI) which might cause the device failure.</a:t>
-            </a:r>
+              <a:t>.</a:t>
+            </a:r>
+            <a:endParaRPr lang="en-GB" sz="3600" dirty="0" smtClean="0">
+              <a:latin typeface="Times New Roman" panose="02020603050405020304" pitchFamily="18" charset="0"/>
+              <a:cs typeface="Times New Roman" panose="02020603050405020304" pitchFamily="18" charset="0"/>
+            </a:endParaRPr>
           </a:p>
         </p:txBody>
       </p:sp>
@@ -4111,8 +3895,8 @@
         </p:nvSpPr>
         <p:spPr>
           <a:xfrm>
-            <a:off x="23503822" y="14136111"/>
-            <a:ext cx="5140923" cy="1015663"/>
+            <a:off x="22090435" y="14346012"/>
+            <a:ext cx="7762759" cy="553998"/>
           </a:xfrm>
           <a:prstGeom prst="rect">
             <a:avLst/>
@@ -4127,74 +3911,18 @@
           <a:p>
             <a:pPr algn="l"/>
             <a:r>
-              <a:rPr lang="en-US" sz="3000" dirty="0">
-                <a:latin typeface="Times New Roman" panose="02020603050405020304" pitchFamily="18" charset="0"/>
-                <a:cs typeface="Times New Roman" panose="02020603050405020304" pitchFamily="18" charset="0"/>
-              </a:rPr>
-              <a:t>Fig. </a:t>
-            </a:r>
-            <a:r>
-              <a:rPr lang="tr-TR" sz="3000" dirty="0">
-                <a:latin typeface="Times New Roman" panose="02020603050405020304" pitchFamily="18" charset="0"/>
-                <a:cs typeface="Times New Roman" panose="02020603050405020304" pitchFamily="18" charset="0"/>
-              </a:rPr>
-              <a:t>4</a:t>
-            </a:r>
-            <a:r>
-              <a:rPr lang="en-US" sz="3000" dirty="0" smtClean="0">
-                <a:latin typeface="Times New Roman" panose="02020603050405020304" pitchFamily="18" charset="0"/>
-                <a:cs typeface="Times New Roman" panose="02020603050405020304" pitchFamily="18" charset="0"/>
-              </a:rPr>
-              <a:t>:</a:t>
-            </a:r>
-            <a:r>
               <a:rPr lang="tr-TR" sz="3000" dirty="0" smtClean="0">
                 <a:latin typeface="Times New Roman" panose="02020603050405020304" pitchFamily="18" charset="0"/>
                 <a:cs typeface="Times New Roman" panose="02020603050405020304" pitchFamily="18" charset="0"/>
               </a:rPr>
-              <a:t> </a:t>
-            </a:r>
-            <a:r>
-              <a:rPr lang="tr-TR" sz="3000" dirty="0" err="1" smtClean="0">
-                <a:latin typeface="Times New Roman" panose="02020603050405020304" pitchFamily="18" charset="0"/>
-                <a:cs typeface="Times New Roman" panose="02020603050405020304" pitchFamily="18" charset="0"/>
-              </a:rPr>
-              <a:t>Double</a:t>
+              <a:t>Double </a:t>
             </a:r>
             <a:r>
               <a:rPr lang="tr-TR" sz="3000" dirty="0" smtClean="0">
                 <a:latin typeface="Times New Roman" panose="02020603050405020304" pitchFamily="18" charset="0"/>
                 <a:cs typeface="Times New Roman" panose="02020603050405020304" pitchFamily="18" charset="0"/>
               </a:rPr>
-              <a:t> </a:t>
-            </a:r>
-            <a:r>
-              <a:rPr lang="tr-TR" sz="3000" dirty="0" err="1" smtClean="0">
-                <a:latin typeface="Times New Roman" panose="02020603050405020304" pitchFamily="18" charset="0"/>
-                <a:cs typeface="Times New Roman" panose="02020603050405020304" pitchFamily="18" charset="0"/>
-              </a:rPr>
-              <a:t>Pulse</a:t>
-            </a:r>
-            <a:r>
-              <a:rPr lang="tr-TR" sz="3000" dirty="0" smtClean="0">
-                <a:latin typeface="Times New Roman" panose="02020603050405020304" pitchFamily="18" charset="0"/>
-                <a:cs typeface="Times New Roman" panose="02020603050405020304" pitchFamily="18" charset="0"/>
-              </a:rPr>
-              <a:t> Test (DPT) </a:t>
-            </a:r>
-            <a:r>
-              <a:rPr lang="tr-TR" sz="3000" dirty="0" err="1" smtClean="0">
-                <a:latin typeface="Times New Roman" panose="02020603050405020304" pitchFamily="18" charset="0"/>
-                <a:cs typeface="Times New Roman" panose="02020603050405020304" pitchFamily="18" charset="0"/>
-              </a:rPr>
-              <a:t>Circuit</a:t>
-            </a:r>
-            <a:r>
-              <a:rPr lang="tr-TR" sz="3000" dirty="0" smtClean="0">
-                <a:latin typeface="Times New Roman" panose="02020603050405020304" pitchFamily="18" charset="0"/>
-                <a:cs typeface="Times New Roman" panose="02020603050405020304" pitchFamily="18" charset="0"/>
-              </a:rPr>
-              <a:t> </a:t>
+              <a:t>Pulse Test (DPT) Circuit </a:t>
             </a:r>
             <a:r>
               <a:rPr lang="en-GB" sz="3000" dirty="0" smtClean="0">
@@ -4214,7 +3942,7 @@
         </p:nvSpPr>
         <p:spPr>
           <a:xfrm>
-            <a:off x="16070056" y="10677289"/>
+            <a:off x="15943267" y="10234834"/>
             <a:ext cx="6449509" cy="2308324"/>
           </a:xfrm>
           <a:prstGeom prst="rect">
@@ -4234,14 +3962,7 @@
                 <a:latin typeface="Times New Roman" panose="02020603050405020304" pitchFamily="18" charset="0"/>
                 <a:cs typeface="Times New Roman" panose="02020603050405020304" pitchFamily="18" charset="0"/>
               </a:rPr>
-              <a:t>A Double Pulse Test circuit is </a:t>
-            </a:r>
-            <a:r>
-              <a:rPr lang="tr-TR" sz="3600" dirty="0" smtClean="0">
-                <a:latin typeface="Times New Roman" panose="02020603050405020304" pitchFamily="18" charset="0"/>
-                <a:cs typeface="Times New Roman" panose="02020603050405020304" pitchFamily="18" charset="0"/>
-              </a:rPr>
-              <a:t>implemented in MATLAB / Simulink® platform to investigate switching transients.</a:t>
+              <a:t>A Double Pulse Test circuit is implemented in MATLAB / Simulink® platform to investigate switching transients.</a:t>
             </a:r>
             <a:endParaRPr lang="en-GB" sz="3600" dirty="0" smtClean="0">
               <a:latin typeface="Times New Roman" panose="02020603050405020304" pitchFamily="18" charset="0"/>
@@ -4259,13 +3980,13 @@
           <p:nvPr>
             <p:extLst>
               <p:ext uri="{D42A27DB-BD31-4B8C-83A1-F6EECF244321}">
-                <p14:modId xmlns:p14="http://schemas.microsoft.com/office/powerpoint/2010/main" val="3259590733"/>
+                <p14:modId xmlns:p14="http://schemas.microsoft.com/office/powerpoint/2010/main" val="4218379134"/>
               </p:ext>
             </p:extLst>
           </p:nvPr>
         </p:nvGraphicFramePr>
         <p:xfrm>
-          <a:off x="15777992" y="16056481"/>
+          <a:off x="15777992" y="15702517"/>
           <a:ext cx="13706814" cy="1610984"/>
         </p:xfrm>
         <a:graphic>
@@ -5120,7 +4841,7 @@
         </p:nvSpPr>
         <p:spPr>
           <a:xfrm>
-            <a:off x="15747798" y="15265063"/>
+            <a:off x="15747798" y="15085129"/>
             <a:ext cx="12654925" cy="584775"/>
           </a:xfrm>
           <a:prstGeom prst="rect">
@@ -5164,7 +4885,7 @@
         </p:nvSpPr>
         <p:spPr>
           <a:xfrm>
-            <a:off x="15879060" y="18174157"/>
+            <a:off x="15879060" y="17731702"/>
             <a:ext cx="13504678" cy="1754326"/>
           </a:xfrm>
           <a:prstGeom prst="rect">
@@ -5184,7 +4905,28 @@
                 <a:latin typeface="Times New Roman" panose="02020603050405020304" pitchFamily="18" charset="0"/>
                 <a:cs typeface="Times New Roman" panose="02020603050405020304" pitchFamily="18" charset="0"/>
               </a:rPr>
-              <a:t>For better understanding of the switching behavior of e-mode GaNs, the turn-on and turn-off behavior of the selected device is investigated with a DPT circuit step-by-step using three models:</a:t>
+              <a:t>For better understanding of the switching behavior of e-mode GaNs, the turn-on and turn-off behavior of the selected device is investigated </a:t>
+            </a:r>
+            <a:r>
+              <a:rPr lang="tr-TR" sz="3600" dirty="0" smtClean="0">
+                <a:latin typeface="Times New Roman" panose="02020603050405020304" pitchFamily="18" charset="0"/>
+                <a:cs typeface="Times New Roman" panose="02020603050405020304" pitchFamily="18" charset="0"/>
+              </a:rPr>
+              <a:t>with </a:t>
+            </a:r>
+            <a:r>
+              <a:rPr lang="en-US" sz="3600" dirty="0" smtClean="0">
+                <a:latin typeface="Times New Roman" panose="02020603050405020304" pitchFamily="18" charset="0"/>
+                <a:cs typeface="Times New Roman" panose="02020603050405020304" pitchFamily="18" charset="0"/>
+              </a:rPr>
+              <a:t>three </a:t>
+            </a:r>
+            <a:r>
+              <a:rPr lang="en-US" sz="3600" dirty="0">
+                <a:latin typeface="Times New Roman" panose="02020603050405020304" pitchFamily="18" charset="0"/>
+                <a:cs typeface="Times New Roman" panose="02020603050405020304" pitchFamily="18" charset="0"/>
+              </a:rPr>
+              <a:t>models:</a:t>
             </a:r>
             <a:endParaRPr lang="en-GB" sz="3600" dirty="0" smtClean="0">
               <a:latin typeface="Times New Roman" panose="02020603050405020304" pitchFamily="18" charset="0"/>
@@ -5201,7 +4943,7 @@
         </p:nvSpPr>
         <p:spPr>
           <a:xfrm>
-            <a:off x="15879060" y="20139282"/>
+            <a:off x="15879060" y="19549342"/>
             <a:ext cx="13504678" cy="1354217"/>
           </a:xfrm>
           <a:prstGeom prst="rect">
@@ -5266,8 +5008,8 @@
         </p:blipFill>
         <p:spPr bwMode="auto">
           <a:xfrm>
-            <a:off x="16338754" y="21704298"/>
-            <a:ext cx="5400000" cy="4320000"/>
+            <a:off x="16338754" y="20937378"/>
+            <a:ext cx="5760000" cy="4680000"/>
           </a:xfrm>
           <a:prstGeom prst="rect">
             <a:avLst/>
@@ -5302,8 +5044,8 @@
         </p:blipFill>
         <p:spPr bwMode="auto">
           <a:xfrm>
-            <a:off x="23368323" y="21704298"/>
-            <a:ext cx="5400000" cy="4320000"/>
+            <a:off x="23368323" y="20937378"/>
+            <a:ext cx="5760000" cy="4680000"/>
           </a:xfrm>
           <a:prstGeom prst="rect">
             <a:avLst/>
@@ -5338,8 +5080,8 @@
         </p:blipFill>
         <p:spPr bwMode="auto">
           <a:xfrm>
-            <a:off x="16216303" y="26488726"/>
-            <a:ext cx="5400000" cy="4320000"/>
+            <a:off x="16450413" y="26134998"/>
+            <a:ext cx="5760000" cy="4680000"/>
           </a:xfrm>
           <a:prstGeom prst="rect">
             <a:avLst/>
@@ -5374,8 +5116,8 @@
         </p:blipFill>
         <p:spPr bwMode="auto">
           <a:xfrm>
-            <a:off x="23368323" y="26674300"/>
-            <a:ext cx="5400000" cy="4320000"/>
+            <a:off x="23362960" y="26057123"/>
+            <a:ext cx="5760000" cy="4680000"/>
           </a:xfrm>
           <a:prstGeom prst="rect">
             <a:avLst/>
@@ -5399,7 +5141,7 @@
         </p:nvSpPr>
         <p:spPr>
           <a:xfrm>
-            <a:off x="17319793" y="25934728"/>
+            <a:off x="17319793" y="25580764"/>
             <a:ext cx="4021241" cy="553998"/>
           </a:xfrm>
           <a:prstGeom prst="rect">
@@ -5421,10 +5163,6 @@
               </a:rPr>
               <a:t>(a) Top Switch Turn-On</a:t>
             </a:r>
-            <a:endParaRPr lang="tr-TR" sz="3000" dirty="0" smtClean="0">
-              <a:latin typeface="Times New Roman" panose="02020603050405020304" pitchFamily="18" charset="0"/>
-              <a:cs typeface="Times New Roman" panose="02020603050405020304" pitchFamily="18" charset="0"/>
-            </a:endParaRPr>
           </a:p>
         </p:txBody>
       </p:sp>
@@ -5436,7 +5174,7 @@
         </p:nvSpPr>
         <p:spPr>
           <a:xfrm>
-            <a:off x="24153564" y="25920685"/>
+            <a:off x="24153564" y="25566721"/>
             <a:ext cx="4021241" cy="553998"/>
           </a:xfrm>
           <a:prstGeom prst="rect">
@@ -5458,10 +5196,6 @@
               </a:rPr>
               <a:t>(b) Top Switch Turn-Off</a:t>
             </a:r>
-            <a:endParaRPr lang="tr-TR" sz="3000" dirty="0" smtClean="0">
-              <a:latin typeface="Times New Roman" panose="02020603050405020304" pitchFamily="18" charset="0"/>
-              <a:cs typeface="Times New Roman" panose="02020603050405020304" pitchFamily="18" charset="0"/>
-            </a:endParaRPr>
           </a:p>
         </p:txBody>
       </p:sp>
@@ -5495,10 +5229,6 @@
               </a:rPr>
               <a:t>(c) Bottom Switch Turn-Off</a:t>
             </a:r>
-            <a:endParaRPr lang="tr-TR" sz="3000" dirty="0" smtClean="0">
-              <a:latin typeface="Times New Roman" panose="02020603050405020304" pitchFamily="18" charset="0"/>
-              <a:cs typeface="Times New Roman" panose="02020603050405020304" pitchFamily="18" charset="0"/>
-            </a:endParaRPr>
           </a:p>
         </p:txBody>
       </p:sp>
@@ -5532,10 +5262,6 @@
               </a:rPr>
               <a:t>(d) Bottom Switch Turn-On</a:t>
             </a:r>
-            <a:endParaRPr lang="tr-TR" sz="3000" dirty="0" smtClean="0">
-              <a:latin typeface="Times New Roman" panose="02020603050405020304" pitchFamily="18" charset="0"/>
-              <a:cs typeface="Times New Roman" panose="02020603050405020304" pitchFamily="18" charset="0"/>
-            </a:endParaRPr>
           </a:p>
         </p:txBody>
       </p:sp>
@@ -5547,7 +5273,7 @@
         </p:nvSpPr>
         <p:spPr>
           <a:xfrm>
-            <a:off x="16070056" y="31347024"/>
+            <a:off x="16827069" y="31408086"/>
             <a:ext cx="11756351" cy="553998"/>
           </a:xfrm>
           <a:prstGeom prst="rect">
@@ -5562,11 +5288,32 @@
           <a:lstStyle/>
           <a:p>
             <a:r>
+              <a:rPr lang="en-US" sz="3000" dirty="0" smtClean="0">
+                <a:latin typeface="Times New Roman" panose="02020603050405020304" pitchFamily="18" charset="0"/>
+                <a:cs typeface="Times New Roman" panose="02020603050405020304" pitchFamily="18" charset="0"/>
+              </a:rPr>
+              <a:t>Switching </a:t>
+            </a:r>
+            <a:r>
+              <a:rPr lang="tr-TR" sz="3000" dirty="0" smtClean="0">
+                <a:latin typeface="Times New Roman" panose="02020603050405020304" pitchFamily="18" charset="0"/>
+                <a:cs typeface="Times New Roman" panose="02020603050405020304" pitchFamily="18" charset="0"/>
+              </a:rPr>
+              <a:t>waveforms</a:t>
+            </a:r>
+            <a:r>
+              <a:rPr lang="en-US" sz="3000" dirty="0" smtClean="0">
+                <a:latin typeface="Times New Roman" panose="02020603050405020304" pitchFamily="18" charset="0"/>
+                <a:cs typeface="Times New Roman" panose="02020603050405020304" pitchFamily="18" charset="0"/>
+              </a:rPr>
+              <a:t> obtained </a:t>
+            </a:r>
+            <a:r>
               <a:rPr lang="en-US" sz="3000" dirty="0">
                 <a:latin typeface="Times New Roman" panose="02020603050405020304" pitchFamily="18" charset="0"/>
                 <a:cs typeface="Times New Roman" panose="02020603050405020304" pitchFamily="18" charset="0"/>
               </a:rPr>
-              <a:t>Fig. 5: Switching characteristics in time domain obtained using Model 1</a:t>
+              <a:t>using Model 1</a:t>
             </a:r>
             <a:endParaRPr lang="tr-TR" sz="3000" dirty="0">
               <a:latin typeface="Times New Roman" panose="02020603050405020304" pitchFamily="18" charset="0"/>
@@ -5583,8 +5330,8 @@
         </p:nvSpPr>
         <p:spPr>
           <a:xfrm>
-            <a:off x="16026753" y="31981134"/>
-            <a:ext cx="13356985" cy="2308324"/>
+            <a:off x="15879060" y="31955812"/>
+            <a:ext cx="13724584" cy="1754326"/>
           </a:xfrm>
           <a:prstGeom prst="rect">
             <a:avLst/>
@@ -5602,11 +5349,32 @@
               <a:buChar char="§"/>
             </a:pPr>
             <a:r>
+              <a:rPr lang="tr-TR" sz="3600" b="1" dirty="0" smtClean="0">
+                <a:latin typeface="Times New Roman" panose="02020603050405020304" pitchFamily="18" charset="0"/>
+                <a:cs typeface="Times New Roman" panose="02020603050405020304" pitchFamily="18" charset="0"/>
+              </a:rPr>
+              <a:t>No oscillations </a:t>
+            </a:r>
+            <a:r>
               <a:rPr lang="tr-TR" sz="3600" dirty="0" smtClean="0">
                 <a:latin typeface="Times New Roman" panose="02020603050405020304" pitchFamily="18" charset="0"/>
                 <a:cs typeface="Times New Roman" panose="02020603050405020304" pitchFamily="18" charset="0"/>
               </a:rPr>
-              <a:t>No oscillations since the inductances are not included in the model</a:t>
+              <a:t>since the </a:t>
+            </a:r>
+            <a:r>
+              <a:rPr lang="tr-TR" sz="3600" b="1" dirty="0" smtClean="0">
+                <a:latin typeface="Times New Roman" panose="02020603050405020304" pitchFamily="18" charset="0"/>
+                <a:cs typeface="Times New Roman" panose="02020603050405020304" pitchFamily="18" charset="0"/>
+              </a:rPr>
+              <a:t>inductances are not included </a:t>
+            </a:r>
+            <a:r>
+              <a:rPr lang="tr-TR" sz="3600" dirty="0" smtClean="0">
+                <a:latin typeface="Times New Roman" panose="02020603050405020304" pitchFamily="18" charset="0"/>
+                <a:cs typeface="Times New Roman" panose="02020603050405020304" pitchFamily="18" charset="0"/>
+              </a:rPr>
+              <a:t>in the model</a:t>
             </a:r>
           </a:p>
           <a:p>
@@ -5615,30 +5383,27 @@
               <a:buChar char="§"/>
             </a:pPr>
             <a:r>
+              <a:rPr lang="tr-TR" sz="3600" b="1" dirty="0" smtClean="0">
+                <a:latin typeface="Times New Roman" panose="02020603050405020304" pitchFamily="18" charset="0"/>
+                <a:cs typeface="Times New Roman" panose="02020603050405020304" pitchFamily="18" charset="0"/>
+              </a:rPr>
+              <a:t>Drain current and channel current are different </a:t>
+            </a:r>
+            <a:r>
               <a:rPr lang="tr-TR" sz="3600" dirty="0" smtClean="0">
                 <a:latin typeface="Times New Roman" panose="02020603050405020304" pitchFamily="18" charset="0"/>
                 <a:cs typeface="Times New Roman" panose="02020603050405020304" pitchFamily="18" charset="0"/>
               </a:rPr>
-              <a:t>Drain current and channel current are different due to the charging &amp; discharging of switches’ output capacitances</a:t>
+              <a:t>due to the charging &amp; discharging of switches’ output </a:t>
+            </a:r>
+            <a:r>
+              <a:rPr lang="tr-TR" sz="3600" dirty="0" smtClean="0">
+                <a:latin typeface="Times New Roman" panose="02020603050405020304" pitchFamily="18" charset="0"/>
+                <a:cs typeface="Times New Roman" panose="02020603050405020304" pitchFamily="18" charset="0"/>
+              </a:rPr>
+              <a:t>capacitances</a:t>
             </a:r>
             <a:endParaRPr lang="tr-TR" sz="3600" dirty="0">
-              <a:latin typeface="Times New Roman" panose="02020603050405020304" pitchFamily="18" charset="0"/>
-              <a:cs typeface="Times New Roman" panose="02020603050405020304" pitchFamily="18" charset="0"/>
-            </a:endParaRPr>
-          </a:p>
-          <a:p>
-            <a:pPr marL="571500" indent="-571500" algn="l">
-              <a:buFont typeface="Wingdings" panose="05000000000000000000" pitchFamily="2" charset="2"/>
-              <a:buChar char="§"/>
-            </a:pPr>
-            <a:r>
-              <a:rPr lang="tr-TR" sz="3600" dirty="0" smtClean="0">
-                <a:latin typeface="Times New Roman" panose="02020603050405020304" pitchFamily="18" charset="0"/>
-                <a:cs typeface="Times New Roman" panose="02020603050405020304" pitchFamily="18" charset="0"/>
-              </a:rPr>
-              <a:t>The main characteristics can be observed in Model 1 easily</a:t>
-            </a:r>
-            <a:endParaRPr lang="tr-TR" sz="3600" dirty="0" smtClean="0">
               <a:latin typeface="Times New Roman" panose="02020603050405020304" pitchFamily="18" charset="0"/>
               <a:cs typeface="Times New Roman" panose="02020603050405020304" pitchFamily="18" charset="0"/>
             </a:endParaRPr>
@@ -5653,10 +5418,10 @@
         </p:nvGrpSpPr>
         <p:grpSpPr>
           <a:xfrm>
-            <a:off x="7252132" y="36055263"/>
-            <a:ext cx="7554523" cy="5286841"/>
-            <a:chOff x="15294052" y="8747560"/>
-            <a:chExt cx="7554523" cy="5286841"/>
+            <a:off x="7399455" y="35136893"/>
+            <a:ext cx="7745906" cy="6112823"/>
+            <a:chOff x="15378563" y="8747560"/>
+            <a:chExt cx="7745906" cy="6112823"/>
           </a:xfrm>
         </p:grpSpPr>
         <p:pic>
@@ -5679,7 +5444,7 @@
           <p:spPr bwMode="auto">
             <a:xfrm>
               <a:off x="16209454" y="8747560"/>
-              <a:ext cx="4680000" cy="3960000"/>
+              <a:ext cx="5112000" cy="4968000"/>
             </a:xfrm>
             <a:prstGeom prst="rect">
               <a:avLst/>
@@ -5703,8 +5468,8 @@
           </p:nvSpPr>
           <p:spPr>
             <a:xfrm>
-              <a:off x="15294052" y="12557073"/>
-              <a:ext cx="7554523" cy="1477328"/>
+              <a:off x="15378563" y="13844720"/>
+              <a:ext cx="7745906" cy="1015663"/>
             </a:xfrm>
             <a:prstGeom prst="rect">
               <a:avLst/>
@@ -5719,39 +5484,18 @@
             <a:p>
               <a:pPr algn="l"/>
               <a:r>
-                <a:rPr lang="en-US" sz="3000" dirty="0">
-                  <a:latin typeface="Times New Roman" panose="02020603050405020304" pitchFamily="18" charset="0"/>
-                  <a:cs typeface="Times New Roman" panose="02020603050405020304" pitchFamily="18" charset="0"/>
-                </a:rPr>
-                <a:t>Fig. </a:t>
-              </a:r>
-              <a:r>
-                <a:rPr lang="tr-TR" sz="3000" dirty="0" smtClean="0">
-                  <a:latin typeface="Times New Roman" panose="02020603050405020304" pitchFamily="18" charset="0"/>
-                  <a:cs typeface="Times New Roman" panose="02020603050405020304" pitchFamily="18" charset="0"/>
-                </a:rPr>
-                <a:t>3</a:t>
-              </a:r>
-              <a:r>
                 <a:rPr lang="en-US" sz="3000" dirty="0" smtClean="0">
                   <a:latin typeface="Times New Roman" panose="02020603050405020304" pitchFamily="18" charset="0"/>
                   <a:cs typeface="Times New Roman" panose="02020603050405020304" pitchFamily="18" charset="0"/>
                 </a:rPr>
-                <a:t>:</a:t>
-              </a:r>
-              <a:r>
-                <a:rPr lang="tr-TR" sz="3000" dirty="0" smtClean="0">
-                  <a:latin typeface="Times New Roman" panose="02020603050405020304" pitchFamily="18" charset="0"/>
-                  <a:cs typeface="Times New Roman" panose="02020603050405020304" pitchFamily="18" charset="0"/>
-                </a:rPr>
-                <a:t> </a:t>
+                <a:t>Thermal </a:t>
               </a:r>
               <a:r>
                 <a:rPr lang="en-US" sz="3000" dirty="0">
                   <a:latin typeface="Times New Roman" panose="02020603050405020304" pitchFamily="18" charset="0"/>
                   <a:cs typeface="Times New Roman" panose="02020603050405020304" pitchFamily="18" charset="0"/>
                 </a:rPr>
-                <a:t>Thermal characteristics of </a:t>
+                <a:t>characteristics of </a:t>
               </a:r>
               <a:r>
                 <a:rPr lang="tr-TR" sz="3000" dirty="0" smtClean="0">
@@ -5768,25 +5512,18 @@
                 <a:t>S66508B </a:t>
               </a:r>
               <a:r>
-                <a:rPr lang="en-US" sz="3000" dirty="0">
-                  <a:latin typeface="Times New Roman" panose="02020603050405020304" pitchFamily="18" charset="0"/>
-                  <a:cs typeface="Times New Roman" panose="02020603050405020304" pitchFamily="18" charset="0"/>
-                </a:rPr>
-                <a:t>obtained by the </a:t>
-              </a:r>
-              <a:r>
                 <a:rPr lang="en-US" sz="3000" dirty="0" smtClean="0">
                   <a:latin typeface="Times New Roman" panose="02020603050405020304" pitchFamily="18" charset="0"/>
                   <a:cs typeface="Times New Roman" panose="02020603050405020304" pitchFamily="18" charset="0"/>
                 </a:rPr>
-                <a:t>model for </a:t>
+                <a:t>at </a:t>
               </a:r>
               <a:r>
                 <a:rPr lang="en-US" sz="3000" dirty="0">
                   <a:latin typeface="Times New Roman" panose="02020603050405020304" pitchFamily="18" charset="0"/>
                   <a:cs typeface="Times New Roman" panose="02020603050405020304" pitchFamily="18" charset="0"/>
                 </a:rPr>
-                <a:t>forward conduction at 6V gate-source voltage</a:t>
+                <a:t>6V gate-source voltage</a:t>
               </a:r>
               <a:endParaRPr lang="en-US" sz="3000" dirty="0" smtClean="0">
                 <a:latin typeface="Times New Roman" panose="02020603050405020304" pitchFamily="18" charset="0"/>
@@ -5804,7 +5541,7 @@
         </p:nvSpPr>
         <p:spPr>
           <a:xfrm>
-            <a:off x="1072733" y="36410840"/>
+            <a:off x="1082387" y="35800125"/>
             <a:ext cx="6979920" cy="3416320"/>
           </a:xfrm>
           <a:prstGeom prst="rect">
@@ -5823,25 +5560,46 @@
               <a:buChar char="§"/>
             </a:pPr>
             <a:r>
+              <a:rPr lang="en-GB" sz="3600" b="1" dirty="0" smtClean="0">
+                <a:latin typeface="Times New Roman" panose="02020603050405020304" pitchFamily="18" charset="0"/>
+                <a:cs typeface="Times New Roman" panose="02020603050405020304" pitchFamily="18" charset="0"/>
+              </a:rPr>
+              <a:t>Junction temperature</a:t>
+            </a:r>
+            <a:r>
               <a:rPr lang="en-GB" sz="3600" dirty="0" smtClean="0">
                 <a:latin typeface="Times New Roman" panose="02020603050405020304" pitchFamily="18" charset="0"/>
                 <a:cs typeface="Times New Roman" panose="02020603050405020304" pitchFamily="18" charset="0"/>
               </a:rPr>
-              <a:t>Junction temperature is a key factor which affects the trans</a:t>
-            </a:r>
-            <a:r>
-              <a:rPr lang="tr-TR" sz="3600" dirty="0" smtClean="0">
+              <a:t> is a key factor which </a:t>
+            </a:r>
+            <a:r>
+              <a:rPr lang="en-GB" sz="3600" b="1" dirty="0" smtClean="0">
+                <a:latin typeface="Times New Roman" panose="02020603050405020304" pitchFamily="18" charset="0"/>
+                <a:cs typeface="Times New Roman" panose="02020603050405020304" pitchFamily="18" charset="0"/>
+              </a:rPr>
+              <a:t>affects the trans</a:t>
+            </a:r>
+            <a:r>
+              <a:rPr lang="tr-TR" sz="3600" b="1" dirty="0" smtClean="0">
                 <a:latin typeface="Times New Roman" panose="02020603050405020304" pitchFamily="18" charset="0"/>
                 <a:cs typeface="Times New Roman" panose="02020603050405020304" pitchFamily="18" charset="0"/>
               </a:rPr>
               <a:t>-</a:t>
             </a:r>
             <a:r>
+              <a:rPr lang="en-GB" sz="3600" b="1" dirty="0" smtClean="0">
+                <a:latin typeface="Times New Roman" panose="02020603050405020304" pitchFamily="18" charset="0"/>
+                <a:cs typeface="Times New Roman" panose="02020603050405020304" pitchFamily="18" charset="0"/>
+              </a:rPr>
+              <a:t>conductance </a:t>
+            </a:r>
+            <a:r>
               <a:rPr lang="en-GB" sz="3600" dirty="0" smtClean="0">
                 <a:latin typeface="Times New Roman" panose="02020603050405020304" pitchFamily="18" charset="0"/>
                 <a:cs typeface="Times New Roman" panose="02020603050405020304" pitchFamily="18" charset="0"/>
               </a:rPr>
-              <a:t>conductance of the device</a:t>
+              <a:t>of the device</a:t>
             </a:r>
           </a:p>
           <a:p>
@@ -5854,7 +5612,21 @@
                 <a:latin typeface="Times New Roman" panose="02020603050405020304" pitchFamily="18" charset="0"/>
                 <a:cs typeface="Times New Roman" panose="02020603050405020304" pitchFamily="18" charset="0"/>
               </a:rPr>
-              <a:t>The trans-conductance is nearly halved for every 75ºC increase in junction temperature</a:t>
+              <a:t>The trans-conductance is nearly </a:t>
+            </a:r>
+            <a:r>
+              <a:rPr lang="en-GB" sz="3600" b="1" dirty="0" smtClean="0">
+                <a:latin typeface="Times New Roman" panose="02020603050405020304" pitchFamily="18" charset="0"/>
+                <a:cs typeface="Times New Roman" panose="02020603050405020304" pitchFamily="18" charset="0"/>
+              </a:rPr>
+              <a:t>halved for every 75ºC increase </a:t>
+            </a:r>
+            <a:r>
+              <a:rPr lang="en-GB" sz="3600" dirty="0" smtClean="0">
+                <a:latin typeface="Times New Roman" panose="02020603050405020304" pitchFamily="18" charset="0"/>
+                <a:cs typeface="Times New Roman" panose="02020603050405020304" pitchFamily="18" charset="0"/>
+              </a:rPr>
+              <a:t>in junction temperature</a:t>
             </a:r>
           </a:p>
         </p:txBody>
@@ -5867,7 +5639,7 @@
         </p:nvSpPr>
         <p:spPr>
           <a:xfrm>
-            <a:off x="15722057" y="34729203"/>
+            <a:off x="15722057" y="33903290"/>
             <a:ext cx="13504678" cy="1354217"/>
           </a:xfrm>
           <a:prstGeom prst="rect">
@@ -5932,8 +5704,8 @@
         </p:blipFill>
         <p:spPr bwMode="auto">
           <a:xfrm>
-            <a:off x="16316361" y="36244786"/>
-            <a:ext cx="5400000" cy="4320000"/>
+            <a:off x="16316361" y="35448368"/>
+            <a:ext cx="5760000" cy="4680000"/>
           </a:xfrm>
           <a:prstGeom prst="rect">
             <a:avLst/>
@@ -5968,8 +5740,8 @@
         </p:blipFill>
         <p:spPr bwMode="auto">
           <a:xfrm>
-            <a:off x="22910103" y="36244786"/>
-            <a:ext cx="5400000" cy="4320000"/>
+            <a:off x="22910103" y="35448368"/>
+            <a:ext cx="5760000" cy="4680000"/>
           </a:xfrm>
           <a:prstGeom prst="rect">
             <a:avLst/>
@@ -5993,7 +5765,7 @@
         </p:nvSpPr>
         <p:spPr>
           <a:xfrm>
-            <a:off x="17160267" y="40518787"/>
+            <a:off x="17248758" y="40312308"/>
             <a:ext cx="4021241" cy="553998"/>
           </a:xfrm>
           <a:prstGeom prst="rect">
@@ -6015,10 +5787,6 @@
               </a:rPr>
               <a:t>(a) Top Switch Turn-On</a:t>
             </a:r>
-            <a:endParaRPr lang="tr-TR" sz="3000" dirty="0" smtClean="0">
-              <a:latin typeface="Times New Roman" panose="02020603050405020304" pitchFamily="18" charset="0"/>
-              <a:cs typeface="Times New Roman" panose="02020603050405020304" pitchFamily="18" charset="0"/>
-            </a:endParaRPr>
           </a:p>
         </p:txBody>
       </p:sp>
@@ -6030,7 +5798,7 @@
         </p:nvSpPr>
         <p:spPr>
           <a:xfrm>
-            <a:off x="23994038" y="40504744"/>
+            <a:off x="24082529" y="40298265"/>
             <a:ext cx="4021241" cy="553998"/>
           </a:xfrm>
           <a:prstGeom prst="rect">
@@ -6052,10 +5820,6 @@
               </a:rPr>
               <a:t>(b) Top Switch Turn-Off</a:t>
             </a:r>
-            <a:endParaRPr lang="tr-TR" sz="3000" dirty="0" smtClean="0">
-              <a:latin typeface="Times New Roman" panose="02020603050405020304" pitchFamily="18" charset="0"/>
-              <a:cs typeface="Times New Roman" panose="02020603050405020304" pitchFamily="18" charset="0"/>
-            </a:endParaRPr>
           </a:p>
         </p:txBody>
       </p:sp>
@@ -6736,8 +6500,8 @@
         </p:nvSpPr>
         <p:spPr>
           <a:xfrm>
-            <a:off x="976639" y="7828353"/>
-            <a:ext cx="13356985" cy="2308324"/>
+            <a:off x="976639" y="8270808"/>
+            <a:ext cx="13356985" cy="1200329"/>
           </a:xfrm>
           <a:prstGeom prst="rect">
             <a:avLst/>
@@ -6755,29 +6519,26 @@
               <a:buChar char="§"/>
             </a:pPr>
             <a:r>
+              <a:rPr lang="tr-TR" sz="3600" b="1" dirty="0" smtClean="0">
+                <a:latin typeface="Times New Roman" panose="02020603050405020304" pitchFamily="18" charset="0"/>
+                <a:cs typeface="Times New Roman" panose="02020603050405020304" pitchFamily="18" charset="0"/>
+              </a:rPr>
+              <a:t>Amplitude of the overshoot in currents increased </a:t>
+            </a:r>
+            <a:r>
               <a:rPr lang="tr-TR" sz="3600" dirty="0" smtClean="0">
                 <a:latin typeface="Times New Roman" panose="02020603050405020304" pitchFamily="18" charset="0"/>
                 <a:cs typeface="Times New Roman" panose="02020603050405020304" pitchFamily="18" charset="0"/>
               </a:rPr>
-              <a:t>Amplitude of the overshoot in currents increased because for lower voltages now the Coss is greater than the Coss in Model 1, so the charging and discharging currents are required to be higher</a:t>
-            </a:r>
-          </a:p>
-          <a:p>
-            <a:pPr marL="571500" indent="-571500" algn="l">
-              <a:buFont typeface="Wingdings" panose="05000000000000000000" pitchFamily="2" charset="2"/>
-              <a:buChar char="§"/>
-            </a:pPr>
+              <a:t>because for lower voltages now the Coss is greater than the Coss in Model </a:t>
+            </a:r>
             <a:r>
               <a:rPr lang="tr-TR" sz="3600" dirty="0" smtClean="0">
                 <a:latin typeface="Times New Roman" panose="02020603050405020304" pitchFamily="18" charset="0"/>
                 <a:cs typeface="Times New Roman" panose="02020603050405020304" pitchFamily="18" charset="0"/>
               </a:rPr>
-              <a:t>The transients are more smooth which is more realistic</a:t>
-            </a:r>
-            <a:endParaRPr lang="tr-TR" sz="3600" dirty="0" smtClean="0">
-              <a:latin typeface="Times New Roman" panose="02020603050405020304" pitchFamily="18" charset="0"/>
-              <a:cs typeface="Times New Roman" panose="02020603050405020304" pitchFamily="18" charset="0"/>
-            </a:endParaRPr>
+              <a:t>1</a:t>
+            </a:r>
           </a:p>
         </p:txBody>
       </p:sp>
@@ -6789,7 +6550,7 @@
         </p:nvSpPr>
         <p:spPr>
           <a:xfrm>
-            <a:off x="848611" y="10240174"/>
+            <a:off x="848611" y="9650234"/>
             <a:ext cx="13504678" cy="1354217"/>
           </a:xfrm>
           <a:prstGeom prst="rect">
@@ -6843,10 +6604,10 @@
         </p:nvGrpSpPr>
         <p:grpSpPr>
           <a:xfrm>
-            <a:off x="1052839" y="11600532"/>
-            <a:ext cx="12383818" cy="10420149"/>
-            <a:chOff x="1052839" y="18420432"/>
-            <a:chExt cx="12383818" cy="10420149"/>
+            <a:off x="1321380" y="11145897"/>
+            <a:ext cx="12357289" cy="10848759"/>
+            <a:chOff x="1321380" y="17965797"/>
+            <a:chExt cx="12357289" cy="10848759"/>
           </a:xfrm>
         </p:grpSpPr>
         <p:pic>
@@ -6868,8 +6629,8 @@
           </p:blipFill>
           <p:spPr bwMode="auto">
             <a:xfrm>
-              <a:off x="1321380" y="18585233"/>
-              <a:ext cx="5400000" cy="4320000"/>
+              <a:off x="1321380" y="17965797"/>
+              <a:ext cx="5760000" cy="4680000"/>
             </a:xfrm>
             <a:prstGeom prst="rect">
               <a:avLst/>
@@ -6904,8 +6665,8 @@
           </p:blipFill>
           <p:spPr bwMode="auto">
             <a:xfrm>
-              <a:off x="7975890" y="18420432"/>
-              <a:ext cx="5400000" cy="4320000"/>
+              <a:off x="7903069" y="17979790"/>
+              <a:ext cx="5760000" cy="4680000"/>
             </a:xfrm>
             <a:prstGeom prst="rect">
               <a:avLst/>
@@ -6940,8 +6701,8 @@
           </p:blipFill>
           <p:spPr bwMode="auto">
             <a:xfrm>
-              <a:off x="1321380" y="23432812"/>
-              <a:ext cx="5400000" cy="4320000"/>
+              <a:off x="1321380" y="23137842"/>
+              <a:ext cx="5760000" cy="4680000"/>
             </a:xfrm>
             <a:prstGeom prst="rect">
               <a:avLst/>
@@ -6976,8 +6737,8 @@
           </p:blipFill>
           <p:spPr bwMode="auto">
             <a:xfrm>
-              <a:off x="8036657" y="23432812"/>
-              <a:ext cx="5400000" cy="4320000"/>
+              <a:off x="7918669" y="23137842"/>
+              <a:ext cx="5760000" cy="4680000"/>
             </a:xfrm>
             <a:prstGeom prst="rect">
               <a:avLst/>
@@ -7001,7 +6762,7 @@
           </p:nvSpPr>
           <p:spPr>
             <a:xfrm>
-              <a:off x="2051092" y="22778031"/>
+              <a:off x="2375559" y="22601049"/>
               <a:ext cx="4021241" cy="553998"/>
             </a:xfrm>
             <a:prstGeom prst="rect">
@@ -7023,10 +6784,6 @@
                 </a:rPr>
                 <a:t>(a) Top Switch Turn-On</a:t>
               </a:r>
-              <a:endParaRPr lang="tr-TR" sz="3000" dirty="0" smtClean="0">
-                <a:latin typeface="Times New Roman" panose="02020603050405020304" pitchFamily="18" charset="0"/>
-                <a:cs typeface="Times New Roman" panose="02020603050405020304" pitchFamily="18" charset="0"/>
-              </a:endParaRPr>
             </a:p>
           </p:txBody>
         </p:sp>
@@ -7038,7 +6795,7 @@
           </p:nvSpPr>
           <p:spPr>
             <a:xfrm>
-              <a:off x="9018644" y="22778031"/>
+              <a:off x="9225123" y="22601049"/>
               <a:ext cx="4021241" cy="553998"/>
             </a:xfrm>
             <a:prstGeom prst="rect">
@@ -7060,10 +6817,6 @@
                 </a:rPr>
                 <a:t>(b) Top Switch Turn-Off</a:t>
               </a:r>
-              <a:endParaRPr lang="tr-TR" sz="3000" dirty="0" smtClean="0">
-                <a:latin typeface="Times New Roman" panose="02020603050405020304" pitchFamily="18" charset="0"/>
-                <a:cs typeface="Times New Roman" panose="02020603050405020304" pitchFamily="18" charset="0"/>
-              </a:endParaRPr>
             </a:p>
           </p:txBody>
         </p:sp>
@@ -7075,7 +6828,7 @@
           </p:nvSpPr>
           <p:spPr>
             <a:xfrm>
-              <a:off x="1899693" y="27706813"/>
+              <a:off x="2312651" y="27706813"/>
               <a:ext cx="4492697" cy="553998"/>
             </a:xfrm>
             <a:prstGeom prst="rect">
@@ -7097,10 +6850,6 @@
                 </a:rPr>
                 <a:t>(c) Bottom Switch Turn-Off</a:t>
               </a:r>
-              <a:endParaRPr lang="tr-TR" sz="3000" dirty="0" smtClean="0">
-                <a:latin typeface="Times New Roman" panose="02020603050405020304" pitchFamily="18" charset="0"/>
-                <a:cs typeface="Times New Roman" panose="02020603050405020304" pitchFamily="18" charset="0"/>
-              </a:endParaRPr>
             </a:p>
           </p:txBody>
         </p:sp>
@@ -7112,7 +6861,7 @@
           </p:nvSpPr>
           <p:spPr>
             <a:xfrm>
-              <a:off x="8488226" y="27706813"/>
+              <a:off x="8901184" y="27706813"/>
               <a:ext cx="4492697" cy="553998"/>
             </a:xfrm>
             <a:prstGeom prst="rect">
@@ -7134,10 +6883,6 @@
                 </a:rPr>
                 <a:t>(d) Bottom Switch Turn-On</a:t>
               </a:r>
-              <a:endParaRPr lang="tr-TR" sz="3000" dirty="0" smtClean="0">
-                <a:latin typeface="Times New Roman" panose="02020603050405020304" pitchFamily="18" charset="0"/>
-                <a:cs typeface="Times New Roman" panose="02020603050405020304" pitchFamily="18" charset="0"/>
-              </a:endParaRPr>
             </a:p>
           </p:txBody>
         </p:sp>
@@ -7149,7 +6894,7 @@
           </p:nvSpPr>
           <p:spPr>
             <a:xfrm>
-              <a:off x="1052839" y="28286583"/>
+              <a:off x="1724371" y="28260558"/>
               <a:ext cx="11756351" cy="553998"/>
             </a:xfrm>
             <a:prstGeom prst="rect">
@@ -7164,32 +6909,32 @@
             <a:lstStyle/>
             <a:p>
               <a:r>
-                <a:rPr lang="en-US" sz="3000" dirty="0">
+                <a:rPr lang="en-US" sz="3000" dirty="0" smtClean="0">
                   <a:latin typeface="Times New Roman" panose="02020603050405020304" pitchFamily="18" charset="0"/>
                   <a:cs typeface="Times New Roman" panose="02020603050405020304" pitchFamily="18" charset="0"/>
                 </a:rPr>
-                <a:t>Fig. </a:t>
+                <a:t>Switching </a:t>
               </a:r>
               <a:r>
-                <a:rPr lang="tr-TR" sz="3000" dirty="0">
+                <a:rPr lang="tr-TR" sz="3000" dirty="0" smtClean="0">
                   <a:latin typeface="Times New Roman" panose="02020603050405020304" pitchFamily="18" charset="0"/>
                   <a:cs typeface="Times New Roman" panose="02020603050405020304" pitchFamily="18" charset="0"/>
                 </a:rPr>
-                <a:t>7</a:t>
+                <a:t>waveforms</a:t>
               </a:r>
               <a:r>
                 <a:rPr lang="en-US" sz="3000" dirty="0" smtClean="0">
                   <a:latin typeface="Times New Roman" panose="02020603050405020304" pitchFamily="18" charset="0"/>
                   <a:cs typeface="Times New Roman" panose="02020603050405020304" pitchFamily="18" charset="0"/>
                 </a:rPr>
-                <a:t>: </a:t>
+                <a:t> obtained </a:t>
               </a:r>
               <a:r>
                 <a:rPr lang="en-US" sz="3000" dirty="0">
                   <a:latin typeface="Times New Roman" panose="02020603050405020304" pitchFamily="18" charset="0"/>
                   <a:cs typeface="Times New Roman" panose="02020603050405020304" pitchFamily="18" charset="0"/>
                 </a:rPr>
-                <a:t>Switching characteristics in time domain obtained using Model </a:t>
+                <a:t>using Model </a:t>
               </a:r>
               <a:r>
                 <a:rPr lang="tr-TR" sz="3000" dirty="0" smtClean="0">
@@ -7215,7 +6960,7 @@
         <p:spPr>
           <a:xfrm>
             <a:off x="921365" y="22095943"/>
-            <a:ext cx="13356985" cy="3970318"/>
+            <a:ext cx="13356985" cy="2862322"/>
           </a:xfrm>
           <a:prstGeom prst="rect">
             <a:avLst/>
@@ -7244,49 +6989,49 @@
                 <a:latin typeface="Times New Roman" panose="02020603050405020304" pitchFamily="18" charset="0"/>
                 <a:cs typeface="Times New Roman" panose="02020603050405020304" pitchFamily="18" charset="0"/>
               </a:rPr>
-              <a:t>he </a:t>
+              <a:t>he</a:t>
+            </a:r>
+            <a:r>
+              <a:rPr lang="tr-TR" sz="3600" dirty="0" smtClean="0">
+                <a:latin typeface="Times New Roman" panose="02020603050405020304" pitchFamily="18" charset="0"/>
+                <a:cs typeface="Times New Roman" panose="02020603050405020304" pitchFamily="18" charset="0"/>
+              </a:rPr>
+              <a:t> </a:t>
+            </a:r>
+            <a:r>
+              <a:rPr lang="tr-TR" sz="3600" b="1" dirty="0" smtClean="0">
+                <a:latin typeface="Times New Roman" panose="02020603050405020304" pitchFamily="18" charset="0"/>
+                <a:cs typeface="Times New Roman" panose="02020603050405020304" pitchFamily="18" charset="0"/>
+              </a:rPr>
+              <a:t>all</a:t>
+            </a:r>
+            <a:r>
+              <a:rPr lang="en-US" sz="3600" b="1" dirty="0" smtClean="0">
+                <a:latin typeface="Times New Roman" panose="02020603050405020304" pitchFamily="18" charset="0"/>
+                <a:cs typeface="Times New Roman" panose="02020603050405020304" pitchFamily="18" charset="0"/>
+              </a:rPr>
+              <a:t> </a:t>
+            </a:r>
+            <a:r>
+              <a:rPr lang="en-US" sz="3600" b="1" dirty="0">
+                <a:latin typeface="Times New Roman" panose="02020603050405020304" pitchFamily="18" charset="0"/>
+                <a:cs typeface="Times New Roman" panose="02020603050405020304" pitchFamily="18" charset="0"/>
+              </a:rPr>
+              <a:t>parasitic inductances are added </a:t>
             </a:r>
             <a:r>
               <a:rPr lang="en-US" sz="3600" dirty="0">
                 <a:latin typeface="Times New Roman" panose="02020603050405020304" pitchFamily="18" charset="0"/>
                 <a:cs typeface="Times New Roman" panose="02020603050405020304" pitchFamily="18" charset="0"/>
               </a:rPr>
-              <a:t>parasitic inductances are added to the model, which are caused by packaging, </a:t>
-            </a:r>
-            <a:r>
-              <a:rPr lang="en-US" sz="3600" dirty="0" err="1">
-                <a:latin typeface="Times New Roman" panose="02020603050405020304" pitchFamily="18" charset="0"/>
-                <a:cs typeface="Times New Roman" panose="02020603050405020304" pitchFamily="18" charset="0"/>
-              </a:rPr>
-              <a:t>busbar</a:t>
-            </a:r>
-            <a:r>
-              <a:rPr lang="en-US" sz="3600" dirty="0">
-                <a:latin typeface="Times New Roman" panose="02020603050405020304" pitchFamily="18" charset="0"/>
-                <a:cs typeface="Times New Roman" panose="02020603050405020304" pitchFamily="18" charset="0"/>
-              </a:rPr>
-              <a:t>, conducting parts on the DC side and </a:t>
-            </a:r>
-            <a:r>
-              <a:rPr lang="tr-TR" sz="3600" dirty="0" smtClean="0">
-                <a:latin typeface="Times New Roman" panose="02020603050405020304" pitchFamily="18" charset="0"/>
-                <a:cs typeface="Times New Roman" panose="02020603050405020304" pitchFamily="18" charset="0"/>
-              </a:rPr>
-              <a:t>C</a:t>
-            </a:r>
-            <a:r>
-              <a:rPr lang="en-US" sz="3600" dirty="0" err="1" smtClean="0">
-                <a:latin typeface="Times New Roman" panose="02020603050405020304" pitchFamily="18" charset="0"/>
-                <a:cs typeface="Times New Roman" panose="02020603050405020304" pitchFamily="18" charset="0"/>
-              </a:rPr>
-              <a:t>apacitor</a:t>
+              <a:t>to the </a:t>
             </a:r>
             <a:r>
               <a:rPr lang="en-US" sz="3600" dirty="0" smtClean="0">
                 <a:latin typeface="Times New Roman" panose="02020603050405020304" pitchFamily="18" charset="0"/>
                 <a:cs typeface="Times New Roman" panose="02020603050405020304" pitchFamily="18" charset="0"/>
               </a:rPr>
-              <a:t> ESLs</a:t>
+              <a:t>model</a:t>
             </a:r>
             <a:endParaRPr lang="tr-TR" sz="3600" dirty="0" smtClean="0">
               <a:latin typeface="Times New Roman" panose="02020603050405020304" pitchFamily="18" charset="0"/>
@@ -7299,11 +7044,46 @@
               <a:buChar char="§"/>
             </a:pPr>
             <a:r>
+              <a:rPr lang="tr-TR" sz="3600" b="1" dirty="0" smtClean="0">
+                <a:latin typeface="Times New Roman" panose="02020603050405020304" pitchFamily="18" charset="0"/>
+                <a:cs typeface="Times New Roman" panose="02020603050405020304" pitchFamily="18" charset="0"/>
+              </a:rPr>
+              <a:t>A </a:t>
+            </a:r>
+            <a:r>
+              <a:rPr lang="tr-TR" sz="3600" b="1" dirty="0" smtClean="0">
+                <a:latin typeface="Times New Roman" panose="02020603050405020304" pitchFamily="18" charset="0"/>
+                <a:cs typeface="Times New Roman" panose="02020603050405020304" pitchFamily="18" charset="0"/>
+              </a:rPr>
+              <a:t>large </a:t>
+            </a:r>
+            <a:r>
+              <a:rPr lang="tr-TR" sz="3600" b="1" dirty="0" smtClean="0">
+                <a:latin typeface="Times New Roman" panose="02020603050405020304" pitchFamily="18" charset="0"/>
+                <a:cs typeface="Times New Roman" panose="02020603050405020304" pitchFamily="18" charset="0"/>
+              </a:rPr>
+              <a:t>dip in voltage </a:t>
+            </a:r>
+            <a:r>
               <a:rPr lang="tr-TR" sz="3600" dirty="0" smtClean="0">
                 <a:latin typeface="Times New Roman" panose="02020603050405020304" pitchFamily="18" charset="0"/>
                 <a:cs typeface="Times New Roman" panose="02020603050405020304" pitchFamily="18" charset="0"/>
               </a:rPr>
-              <a:t>A large dip is observed during bottom switch turn-off transient due to the loop inductance.</a:t>
+              <a:t>is observed during bottom switch turn-off transient due to the </a:t>
+            </a:r>
+            <a:r>
+              <a:rPr lang="tr-TR" sz="3600" b="1" dirty="0" smtClean="0">
+                <a:latin typeface="Times New Roman" panose="02020603050405020304" pitchFamily="18" charset="0"/>
+                <a:cs typeface="Times New Roman" panose="02020603050405020304" pitchFamily="18" charset="0"/>
+              </a:rPr>
+              <a:t>loop inductance</a:t>
+            </a:r>
+            <a:r>
+              <a:rPr lang="tr-TR" sz="3600" dirty="0" smtClean="0">
+                <a:latin typeface="Times New Roman" panose="02020603050405020304" pitchFamily="18" charset="0"/>
+                <a:cs typeface="Times New Roman" panose="02020603050405020304" pitchFamily="18" charset="0"/>
+              </a:rPr>
+              <a:t>.</a:t>
             </a:r>
           </a:p>
           <a:p>
@@ -7316,10 +7096,17 @@
                 <a:latin typeface="Times New Roman" panose="02020603050405020304" pitchFamily="18" charset="0"/>
                 <a:cs typeface="Times New Roman" panose="02020603050405020304" pitchFamily="18" charset="0"/>
               </a:rPr>
-              <a:t>The damping </a:t>
-            </a:r>
-            <a:r>
-              <a:rPr lang="en-US" sz="3600" dirty="0" smtClean="0">
+              <a:t>The </a:t>
+            </a:r>
+            <a:r>
+              <a:rPr lang="en-US" sz="3600" b="1" dirty="0">
+                <a:latin typeface="Times New Roman" panose="02020603050405020304" pitchFamily="18" charset="0"/>
+                <a:cs typeface="Times New Roman" panose="02020603050405020304" pitchFamily="18" charset="0"/>
+              </a:rPr>
+              <a:t>damping </a:t>
+            </a:r>
+            <a:r>
+              <a:rPr lang="en-US" sz="3600" b="1" dirty="0" smtClean="0">
                 <a:latin typeface="Times New Roman" panose="02020603050405020304" pitchFamily="18" charset="0"/>
                 <a:cs typeface="Times New Roman" panose="02020603050405020304" pitchFamily="18" charset="0"/>
               </a:rPr>
@@ -7330,24 +7117,66 @@
                 <a:latin typeface="Times New Roman" panose="02020603050405020304" pitchFamily="18" charset="0"/>
                 <a:cs typeface="Times New Roman" panose="02020603050405020304" pitchFamily="18" charset="0"/>
               </a:rPr>
-              <a:t>is dependent on the C</a:t>
-            </a:r>
-            <a:r>
-              <a:rPr lang="en-US" sz="3600" baseline="-25000" dirty="0">
+              <a:t>is dependent on the </a:t>
+            </a:r>
+            <a:r>
+              <a:rPr lang="en-US" sz="3600" b="1" dirty="0">
+                <a:latin typeface="Times New Roman" panose="02020603050405020304" pitchFamily="18" charset="0"/>
+                <a:cs typeface="Times New Roman" panose="02020603050405020304" pitchFamily="18" charset="0"/>
+              </a:rPr>
+              <a:t>C</a:t>
+            </a:r>
+            <a:r>
+              <a:rPr lang="en-US" sz="3600" b="1" baseline="-25000" dirty="0">
                 <a:latin typeface="Times New Roman" panose="02020603050405020304" pitchFamily="18" charset="0"/>
                 <a:cs typeface="Times New Roman" panose="02020603050405020304" pitchFamily="18" charset="0"/>
               </a:rPr>
               <a:t>OSS</a:t>
             </a:r>
             <a:r>
+              <a:rPr lang="en-US" sz="3600" b="1" dirty="0">
+                <a:latin typeface="Times New Roman" panose="02020603050405020304" pitchFamily="18" charset="0"/>
+                <a:cs typeface="Times New Roman" panose="02020603050405020304" pitchFamily="18" charset="0"/>
+              </a:rPr>
+              <a:t>, loop </a:t>
+            </a:r>
+            <a:r>
+              <a:rPr lang="en-US" sz="3600" b="1" dirty="0" smtClean="0">
+                <a:latin typeface="Times New Roman" panose="02020603050405020304" pitchFamily="18" charset="0"/>
+                <a:cs typeface="Times New Roman" panose="02020603050405020304" pitchFamily="18" charset="0"/>
+              </a:rPr>
+              <a:t>inductance</a:t>
+            </a:r>
+            <a:r>
+              <a:rPr lang="tr-TR" sz="3600" b="1" dirty="0" smtClean="0">
+                <a:latin typeface="Times New Roman" panose="02020603050405020304" pitchFamily="18" charset="0"/>
+                <a:cs typeface="Times New Roman" panose="02020603050405020304" pitchFamily="18" charset="0"/>
+              </a:rPr>
+              <a:t>, </a:t>
+            </a:r>
+            <a:r>
+              <a:rPr lang="en-US" sz="3600" b="1" dirty="0" smtClean="0">
+                <a:latin typeface="Times New Roman" panose="02020603050405020304" pitchFamily="18" charset="0"/>
+                <a:cs typeface="Times New Roman" panose="02020603050405020304" pitchFamily="18" charset="0"/>
+              </a:rPr>
+              <a:t> drain/source </a:t>
+            </a:r>
+            <a:r>
+              <a:rPr lang="en-US" sz="3600" b="1" dirty="0">
+                <a:latin typeface="Times New Roman" panose="02020603050405020304" pitchFamily="18" charset="0"/>
+                <a:cs typeface="Times New Roman" panose="02020603050405020304" pitchFamily="18" charset="0"/>
+              </a:rPr>
+              <a:t>parasitic inductances </a:t>
+            </a:r>
+            <a:r>
               <a:rPr lang="en-US" sz="3600" dirty="0">
                 <a:latin typeface="Times New Roman" panose="02020603050405020304" pitchFamily="18" charset="0"/>
                 <a:cs typeface="Times New Roman" panose="02020603050405020304" pitchFamily="18" charset="0"/>
               </a:rPr>
-              <a:t>, loop inductance and drain/source parasitic inductances and </a:t>
-            </a:r>
-            <a:r>
-              <a:rPr lang="en-US" sz="3600" dirty="0" smtClean="0">
+              <a:t>and </a:t>
+            </a:r>
+            <a:r>
+              <a:rPr lang="en-US" sz="3600" b="1" dirty="0" smtClean="0">
                 <a:latin typeface="Times New Roman" panose="02020603050405020304" pitchFamily="18" charset="0"/>
                 <a:cs typeface="Times New Roman" panose="02020603050405020304" pitchFamily="18" charset="0"/>
               </a:rPr>
@@ -7360,10 +7189,6 @@
               </a:rPr>
               <a:t> [8]</a:t>
             </a:r>
-            <a:endParaRPr lang="tr-TR" sz="3600" dirty="0" smtClean="0">
-              <a:latin typeface="Times New Roman" panose="02020603050405020304" pitchFamily="18" charset="0"/>
-              <a:cs typeface="Times New Roman" panose="02020603050405020304" pitchFamily="18" charset="0"/>
-            </a:endParaRPr>
           </a:p>
         </p:txBody>
       </p:sp>
@@ -7377,7 +7202,7 @@
         </p:nvSpPr>
         <p:spPr bwMode="auto">
           <a:xfrm>
-            <a:off x="3244839" y="25972754"/>
+            <a:off x="3982261" y="24969862"/>
             <a:ext cx="7372350" cy="923330"/>
           </a:xfrm>
           <a:prstGeom prst="rect">
@@ -7423,10 +7248,10 @@
         </p:nvGrpSpPr>
         <p:grpSpPr>
           <a:xfrm>
-            <a:off x="1052838" y="26850402"/>
-            <a:ext cx="13225512" cy="8467622"/>
-            <a:chOff x="1052838" y="33708402"/>
-            <a:chExt cx="13225512" cy="8467622"/>
+            <a:off x="1102027" y="25877007"/>
+            <a:ext cx="13225512" cy="10360646"/>
+            <a:chOff x="1279009" y="32735007"/>
+            <a:chExt cx="13225512" cy="10360646"/>
           </a:xfrm>
         </p:grpSpPr>
         <p:pic>
@@ -7442,8 +7267,8 @@
           </p:blipFill>
           <p:spPr bwMode="auto">
             <a:xfrm>
-              <a:off x="1321380" y="33714132"/>
-              <a:ext cx="5400000" cy="3600000"/>
+              <a:off x="1321380" y="32740737"/>
+              <a:ext cx="6120000" cy="4320000"/>
             </a:xfrm>
             <a:prstGeom prst="rect">
               <a:avLst/>
@@ -7471,8 +7296,8 @@
           </p:blipFill>
           <p:spPr bwMode="auto">
             <a:xfrm>
-              <a:off x="8034574" y="33708402"/>
-              <a:ext cx="5400000" cy="3600000"/>
+              <a:off x="8034574" y="32735007"/>
+              <a:ext cx="6120000" cy="4320000"/>
             </a:xfrm>
             <a:prstGeom prst="rect">
               <a:avLst/>
@@ -7501,7 +7326,7 @@
           <p:spPr bwMode="auto">
             <a:xfrm>
               <a:off x="1321380" y="37686688"/>
-              <a:ext cx="5400000" cy="3600000"/>
+              <a:ext cx="6120000" cy="4320000"/>
             </a:xfrm>
             <a:prstGeom prst="rect">
               <a:avLst/>
@@ -7536,7 +7361,7 @@
           <p:spPr bwMode="auto">
             <a:xfrm>
               <a:off x="8034574" y="37686688"/>
-              <a:ext cx="5400000" cy="3600000"/>
+              <a:ext cx="6120000" cy="4320000"/>
             </a:xfrm>
             <a:prstGeom prst="rect">
               <a:avLst/>
@@ -7582,10 +7407,6 @@
                 </a:rPr>
                 <a:t>(a) Top Switch Turn-On</a:t>
               </a:r>
-              <a:endParaRPr lang="tr-TR" sz="3000" dirty="0" smtClean="0">
-                <a:latin typeface="Times New Roman" panose="02020603050405020304" pitchFamily="18" charset="0"/>
-                <a:cs typeface="Times New Roman" panose="02020603050405020304" pitchFamily="18" charset="0"/>
-              </a:endParaRPr>
             </a:p>
           </p:txBody>
         </p:sp>
@@ -7619,10 +7440,6 @@
                 </a:rPr>
                 <a:t>(b) Top Switch Turn-Off</a:t>
               </a:r>
-              <a:endParaRPr lang="tr-TR" sz="3000" dirty="0" smtClean="0">
-                <a:latin typeface="Times New Roman" panose="02020603050405020304" pitchFamily="18" charset="0"/>
-                <a:cs typeface="Times New Roman" panose="02020603050405020304" pitchFamily="18" charset="0"/>
-              </a:endParaRPr>
             </a:p>
           </p:txBody>
         </p:sp>
@@ -7634,7 +7451,7 @@
           </p:nvSpPr>
           <p:spPr>
             <a:xfrm>
-              <a:off x="1896566" y="41145198"/>
+              <a:off x="1896566" y="42059599"/>
               <a:ext cx="4492697" cy="553998"/>
             </a:xfrm>
             <a:prstGeom prst="rect">
@@ -7656,10 +7473,6 @@
                 </a:rPr>
                 <a:t>(c) Bottom Switch Turn-Off</a:t>
               </a:r>
-              <a:endParaRPr lang="tr-TR" sz="3000" dirty="0" smtClean="0">
-                <a:latin typeface="Times New Roman" panose="02020603050405020304" pitchFamily="18" charset="0"/>
-                <a:cs typeface="Times New Roman" panose="02020603050405020304" pitchFamily="18" charset="0"/>
-              </a:endParaRPr>
             </a:p>
           </p:txBody>
         </p:sp>
@@ -7671,7 +7484,7 @@
           </p:nvSpPr>
           <p:spPr>
             <a:xfrm>
-              <a:off x="8782915" y="41139526"/>
+              <a:off x="8782915" y="42053927"/>
               <a:ext cx="4492697" cy="553998"/>
             </a:xfrm>
             <a:prstGeom prst="rect">
@@ -7693,10 +7506,6 @@
                 </a:rPr>
                 <a:t>(d) Bottom Switch Turn-On</a:t>
               </a:r>
-              <a:endParaRPr lang="tr-TR" sz="3000" dirty="0" smtClean="0">
-                <a:latin typeface="Times New Roman" panose="02020603050405020304" pitchFamily="18" charset="0"/>
-                <a:cs typeface="Times New Roman" panose="02020603050405020304" pitchFamily="18" charset="0"/>
-              </a:endParaRPr>
             </a:p>
           </p:txBody>
         </p:sp>
@@ -7708,7 +7517,7 @@
           </p:nvSpPr>
           <p:spPr>
             <a:xfrm>
-              <a:off x="1052838" y="41622026"/>
+              <a:off x="1279009" y="42541655"/>
               <a:ext cx="13225512" cy="553998"/>
             </a:xfrm>
             <a:prstGeom prst="rect">
@@ -7723,32 +7532,18 @@
             <a:lstStyle/>
             <a:p>
               <a:r>
-                <a:rPr lang="en-US" sz="3000" dirty="0">
-                  <a:latin typeface="Times New Roman" panose="02020603050405020304" pitchFamily="18" charset="0"/>
-                  <a:cs typeface="Times New Roman" panose="02020603050405020304" pitchFamily="18" charset="0"/>
-                </a:rPr>
-                <a:t>Fig. </a:t>
-              </a:r>
-              <a:r>
-                <a:rPr lang="tr-TR" sz="3000" dirty="0" smtClean="0">
-                  <a:latin typeface="Times New Roman" panose="02020603050405020304" pitchFamily="18" charset="0"/>
-                  <a:cs typeface="Times New Roman" panose="02020603050405020304" pitchFamily="18" charset="0"/>
-                </a:rPr>
-                <a:t>8</a:t>
-              </a:r>
-              <a:r>
                 <a:rPr lang="en-US" sz="3000" dirty="0" smtClean="0">
                   <a:latin typeface="Times New Roman" panose="02020603050405020304" pitchFamily="18" charset="0"/>
                   <a:cs typeface="Times New Roman" panose="02020603050405020304" pitchFamily="18" charset="0"/>
                 </a:rPr>
-                <a:t>: </a:t>
+                <a:t>Switching </a:t>
               </a:r>
               <a:r>
                 <a:rPr lang="en-US" sz="3000" dirty="0">
                   <a:latin typeface="Times New Roman" panose="02020603050405020304" pitchFamily="18" charset="0"/>
                   <a:cs typeface="Times New Roman" panose="02020603050405020304" pitchFamily="18" charset="0"/>
                 </a:rPr>
-                <a:t>Switching characteristics as state trajectories (obtained using all the models)</a:t>
+                <a:t>characteristics as state trajectories (obtained using all the models)</a:t>
               </a:r>
               <a:endParaRPr lang="tr-TR" sz="3000" dirty="0">
                 <a:latin typeface="Times New Roman" panose="02020603050405020304" pitchFamily="18" charset="0"/>
@@ -7766,10 +7561,10 @@
         </p:nvGrpSpPr>
         <p:grpSpPr>
           <a:xfrm>
-            <a:off x="15680589" y="2123892"/>
-            <a:ext cx="13936942" cy="8517880"/>
-            <a:chOff x="15680589" y="9096192"/>
-            <a:chExt cx="13936942" cy="8517880"/>
+            <a:off x="15970567" y="1828922"/>
+            <a:ext cx="13936942" cy="10022071"/>
+            <a:chOff x="15970567" y="8801222"/>
+            <a:chExt cx="13936942" cy="10022071"/>
           </a:xfrm>
         </p:grpSpPr>
         <p:pic>
@@ -7785,8 +7580,8 @@
           </p:blipFill>
           <p:spPr bwMode="auto">
             <a:xfrm>
-              <a:off x="16256230" y="9096192"/>
-              <a:ext cx="5400000" cy="3600000"/>
+              <a:off x="16108745" y="8801222"/>
+              <a:ext cx="6120000" cy="4320000"/>
             </a:xfrm>
             <a:prstGeom prst="rect">
               <a:avLst/>
@@ -7814,8 +7609,8 @@
           </p:blipFill>
           <p:spPr bwMode="auto">
             <a:xfrm>
-              <a:off x="23254831" y="9096192"/>
-              <a:ext cx="5400000" cy="3600000"/>
+              <a:off x="23107346" y="8801222"/>
+              <a:ext cx="6120000" cy="4320000"/>
             </a:xfrm>
             <a:prstGeom prst="rect">
               <a:avLst/>
@@ -7843,8 +7638,8 @@
           </p:blipFill>
           <p:spPr bwMode="auto">
             <a:xfrm>
-              <a:off x="16256230" y="13127977"/>
-              <a:ext cx="5400000" cy="3600000"/>
+              <a:off x="16167739" y="13481941"/>
+              <a:ext cx="6120000" cy="4320000"/>
             </a:xfrm>
             <a:prstGeom prst="rect">
               <a:avLst/>
@@ -7878,8 +7673,8 @@
           </p:blipFill>
           <p:spPr bwMode="auto">
             <a:xfrm>
-              <a:off x="23254831" y="13127977"/>
-              <a:ext cx="5400000" cy="3600000"/>
+              <a:off x="23166340" y="13481941"/>
+              <a:ext cx="6120000" cy="4320000"/>
             </a:xfrm>
             <a:prstGeom prst="rect">
               <a:avLst/>
@@ -7903,7 +7698,7 @@
           </p:nvSpPr>
           <p:spPr>
             <a:xfrm>
-              <a:off x="17111340" y="12573979"/>
+              <a:off x="17111340" y="13134422"/>
               <a:ext cx="4021241" cy="553998"/>
             </a:xfrm>
             <a:prstGeom prst="rect">
@@ -7925,10 +7720,6 @@
                 </a:rPr>
                 <a:t>(a) Top Switch Turn-On</a:t>
               </a:r>
-              <a:endParaRPr lang="tr-TR" sz="3000" dirty="0" smtClean="0">
-                <a:latin typeface="Times New Roman" panose="02020603050405020304" pitchFamily="18" charset="0"/>
-                <a:cs typeface="Times New Roman" panose="02020603050405020304" pitchFamily="18" charset="0"/>
-              </a:endParaRPr>
             </a:p>
           </p:txBody>
         </p:sp>
@@ -7940,7 +7731,7 @@
           </p:nvSpPr>
           <p:spPr>
             <a:xfrm>
-              <a:off x="23945111" y="12577342"/>
+              <a:off x="24033602" y="12990300"/>
               <a:ext cx="4021241" cy="553998"/>
             </a:xfrm>
             <a:prstGeom prst="rect">
@@ -7962,10 +7753,6 @@
                 </a:rPr>
                 <a:t>(b) Top Switch Turn-Off</a:t>
               </a:r>
-              <a:endParaRPr lang="tr-TR" sz="3000" dirty="0" smtClean="0">
-                <a:latin typeface="Times New Roman" panose="02020603050405020304" pitchFamily="18" charset="0"/>
-                <a:cs typeface="Times New Roman" panose="02020603050405020304" pitchFamily="18" charset="0"/>
-              </a:endParaRPr>
             </a:p>
           </p:txBody>
         </p:sp>
@@ -7977,7 +7764,7 @@
           </p:nvSpPr>
           <p:spPr>
             <a:xfrm>
-              <a:off x="16721086" y="16546535"/>
+              <a:off x="16721086" y="17755911"/>
               <a:ext cx="4492697" cy="553998"/>
             </a:xfrm>
             <a:prstGeom prst="rect">
@@ -7999,10 +7786,6 @@
                 </a:rPr>
                 <a:t>(c) Bottom Switch Turn-Off</a:t>
               </a:r>
-              <a:endParaRPr lang="tr-TR" sz="3000" dirty="0" smtClean="0">
-                <a:latin typeface="Times New Roman" panose="02020603050405020304" pitchFamily="18" charset="0"/>
-                <a:cs typeface="Times New Roman" panose="02020603050405020304" pitchFamily="18" charset="0"/>
-              </a:endParaRPr>
             </a:p>
           </p:txBody>
         </p:sp>
@@ -8014,7 +7797,7 @@
           </p:nvSpPr>
           <p:spPr>
             <a:xfrm>
-              <a:off x="23607435" y="16540863"/>
+              <a:off x="23990896" y="17720742"/>
               <a:ext cx="4492697" cy="553998"/>
             </a:xfrm>
             <a:prstGeom prst="rect">
@@ -8036,10 +7819,6 @@
                 </a:rPr>
                 <a:t>(d) Bottom Switch Turn-On</a:t>
               </a:r>
-              <a:endParaRPr lang="tr-TR" sz="3000" dirty="0" smtClean="0">
-                <a:latin typeface="Times New Roman" panose="02020603050405020304" pitchFamily="18" charset="0"/>
-                <a:cs typeface="Times New Roman" panose="02020603050405020304" pitchFamily="18" charset="0"/>
-              </a:endParaRPr>
             </a:p>
           </p:txBody>
         </p:sp>
@@ -8051,7 +7830,7 @@
           </p:nvSpPr>
           <p:spPr>
             <a:xfrm>
-              <a:off x="15680589" y="17060074"/>
+              <a:off x="15970567" y="18269295"/>
               <a:ext cx="13936942" cy="553998"/>
             </a:xfrm>
             <a:prstGeom prst="rect">
@@ -8066,32 +7845,32 @@
             <a:lstStyle/>
             <a:p>
               <a:r>
+                <a:rPr lang="en-US" sz="3000" dirty="0" smtClean="0">
+                  <a:latin typeface="Times New Roman" panose="02020603050405020304" pitchFamily="18" charset="0"/>
+                  <a:cs typeface="Times New Roman" panose="02020603050405020304" pitchFamily="18" charset="0"/>
+                </a:rPr>
+                <a:t>Switching </a:t>
+              </a:r>
+              <a:r>
                 <a:rPr lang="en-US" sz="3000" dirty="0">
                   <a:latin typeface="Times New Roman" panose="02020603050405020304" pitchFamily="18" charset="0"/>
                   <a:cs typeface="Times New Roman" panose="02020603050405020304" pitchFamily="18" charset="0"/>
                 </a:rPr>
-                <a:t>Fig. </a:t>
-              </a:r>
-              <a:r>
-                <a:rPr lang="tr-TR" sz="3000" dirty="0" smtClean="0">
-                  <a:latin typeface="Times New Roman" panose="02020603050405020304" pitchFamily="18" charset="0"/>
-                  <a:cs typeface="Times New Roman" panose="02020603050405020304" pitchFamily="18" charset="0"/>
-                </a:rPr>
-                <a:t>9</a:t>
+                <a:t>characteristics </a:t>
               </a:r>
               <a:r>
                 <a:rPr lang="en-US" sz="3000" dirty="0" smtClean="0">
                   <a:latin typeface="Times New Roman" panose="02020603050405020304" pitchFamily="18" charset="0"/>
                   <a:cs typeface="Times New Roman" panose="02020603050405020304" pitchFamily="18" charset="0"/>
                 </a:rPr>
-                <a:t>: </a:t>
+                <a:t>for </a:t>
               </a:r>
               <a:r>
                 <a:rPr lang="en-US" sz="3000" dirty="0">
                   <a:latin typeface="Times New Roman" panose="02020603050405020304" pitchFamily="18" charset="0"/>
                   <a:cs typeface="Times New Roman" panose="02020603050405020304" pitchFamily="18" charset="0"/>
                 </a:rPr>
-                <a:t>Switching characteristics as state trajectories for different temperatures (Model 3</a:t>
+                <a:t>different temperatures (Model 3</a:t>
               </a:r>
               <a:r>
                 <a:rPr lang="en-US" sz="3000" dirty="0" smtClean="0">
@@ -8116,8 +7895,8 @@
         </p:nvSpPr>
         <p:spPr>
           <a:xfrm>
-            <a:off x="15879060" y="10791903"/>
-            <a:ext cx="13356985" cy="2308324"/>
+            <a:off x="16020800" y="11794182"/>
+            <a:ext cx="13356985" cy="1200329"/>
           </a:xfrm>
           <a:prstGeom prst="rect">
             <a:avLst/>
@@ -8139,8 +7918,12 @@
                 <a:latin typeface="Times New Roman" panose="02020603050405020304" pitchFamily="18" charset="0"/>
                 <a:cs typeface="Times New Roman" panose="02020603050405020304" pitchFamily="18" charset="0"/>
               </a:rPr>
-              <a:t>Overshoot amplitude and voltage dip is decreased with temperature as seen in (d) due to lower transition speed</a:t>
-            </a:r>
+              <a:t>Overshoot amplitude and voltage dip is decreased with temperature </a:t>
+            </a:r>
+            <a:endParaRPr lang="tr-TR" sz="3600" dirty="0" smtClean="0">
+              <a:latin typeface="Times New Roman" panose="02020603050405020304" pitchFamily="18" charset="0"/>
+              <a:cs typeface="Times New Roman" panose="02020603050405020304" pitchFamily="18" charset="0"/>
+            </a:endParaRPr>
           </a:p>
           <a:p>
             <a:pPr marL="571500" indent="-571500" algn="just">
@@ -8152,7 +7935,21 @@
                 <a:latin typeface="Times New Roman" panose="02020603050405020304" pitchFamily="18" charset="0"/>
                 <a:cs typeface="Times New Roman" panose="02020603050405020304" pitchFamily="18" charset="0"/>
               </a:rPr>
-              <a:t>The trans-conductance decreases with temperature; thus, for the same amount of current the drain-source voltage level increases</a:t>
+              <a:t>The </a:t>
+            </a:r>
+            <a:r>
+              <a:rPr lang="tr-TR" sz="3600" dirty="0" smtClean="0">
+                <a:latin typeface="Times New Roman" panose="02020603050405020304" pitchFamily="18" charset="0"/>
+                <a:cs typeface="Times New Roman" panose="02020603050405020304" pitchFamily="18" charset="0"/>
+              </a:rPr>
+              <a:t>trans-conductance decreases with </a:t>
+            </a:r>
+            <a:r>
+              <a:rPr lang="tr-TR" sz="3600" dirty="0" smtClean="0">
+                <a:latin typeface="Times New Roman" panose="02020603050405020304" pitchFamily="18" charset="0"/>
+                <a:cs typeface="Times New Roman" panose="02020603050405020304" pitchFamily="18" charset="0"/>
+              </a:rPr>
+              <a:t>temperature</a:t>
             </a:r>
             <a:endParaRPr lang="tr-TR" sz="3600" dirty="0" smtClean="0">
               <a:latin typeface="Times New Roman" panose="02020603050405020304" pitchFamily="18" charset="0"/>
@@ -8169,10 +7966,10 @@
         </p:nvGrpSpPr>
         <p:grpSpPr>
           <a:xfrm>
-            <a:off x="15680588" y="13379532"/>
-            <a:ext cx="14037411" cy="8467165"/>
-            <a:chOff x="15680588" y="20161332"/>
-            <a:chExt cx="14037411" cy="8467165"/>
+            <a:off x="15680588" y="12966574"/>
+            <a:ext cx="14037411" cy="9736465"/>
+            <a:chOff x="15680588" y="19748374"/>
+            <a:chExt cx="14037411" cy="9736465"/>
           </a:xfrm>
         </p:grpSpPr>
         <p:pic>
@@ -8188,8 +7985,8 @@
           </p:blipFill>
           <p:spPr bwMode="auto">
             <a:xfrm>
-              <a:off x="16256230" y="20161332"/>
-              <a:ext cx="5400000" cy="3600000"/>
+              <a:off x="16049751" y="19748374"/>
+              <a:ext cx="6120000" cy="4320000"/>
             </a:xfrm>
             <a:prstGeom prst="rect">
               <a:avLst/>
@@ -8217,8 +8014,8 @@
           </p:blipFill>
           <p:spPr bwMode="auto">
             <a:xfrm>
-              <a:off x="23254831" y="20161332"/>
-              <a:ext cx="5400000" cy="3600000"/>
+              <a:off x="23048352" y="19748374"/>
+              <a:ext cx="6120000" cy="4320000"/>
             </a:xfrm>
             <a:prstGeom prst="rect">
               <a:avLst/>
@@ -8246,8 +8043,8 @@
           </p:blipFill>
           <p:spPr bwMode="auto">
             <a:xfrm>
-              <a:off x="16268656" y="24153183"/>
-              <a:ext cx="5400000" cy="3600000"/>
+              <a:off x="16109002" y="24369081"/>
+              <a:ext cx="6120000" cy="4320000"/>
             </a:xfrm>
             <a:prstGeom prst="rect">
               <a:avLst/>
@@ -8281,8 +8078,8 @@
           </p:blipFill>
           <p:spPr bwMode="auto">
             <a:xfrm>
-              <a:off x="23254831" y="24126328"/>
-              <a:ext cx="5400000" cy="3600000"/>
+              <a:off x="23095177" y="24342226"/>
+              <a:ext cx="6120000" cy="4320000"/>
             </a:xfrm>
             <a:prstGeom prst="rect">
               <a:avLst/>
@@ -8306,7 +8103,7 @@
           </p:nvSpPr>
           <p:spPr>
             <a:xfrm>
-              <a:off x="17339940" y="23591073"/>
+              <a:off x="17427024" y="23921267"/>
               <a:ext cx="4021241" cy="553998"/>
             </a:xfrm>
             <a:prstGeom prst="rect">
@@ -8328,10 +8125,6 @@
                 </a:rPr>
                 <a:t>(a) Top Switch Turn-On</a:t>
               </a:r>
-              <a:endParaRPr lang="tr-TR" sz="3000" dirty="0" smtClean="0">
-                <a:latin typeface="Times New Roman" panose="02020603050405020304" pitchFamily="18" charset="0"/>
-                <a:cs typeface="Times New Roman" panose="02020603050405020304" pitchFamily="18" charset="0"/>
-              </a:endParaRPr>
             </a:p>
           </p:txBody>
         </p:sp>
@@ -8343,7 +8136,7 @@
           </p:nvSpPr>
           <p:spPr>
             <a:xfrm>
-              <a:off x="24173711" y="23594436"/>
+              <a:off x="24362393" y="23924630"/>
               <a:ext cx="4021241" cy="553998"/>
             </a:xfrm>
             <a:prstGeom prst="rect">
@@ -8365,10 +8158,6 @@
                 </a:rPr>
                 <a:t>(b) Top Switch Turn-Off</a:t>
               </a:r>
-              <a:endParaRPr lang="tr-TR" sz="3000" dirty="0" smtClean="0">
-                <a:latin typeface="Times New Roman" panose="02020603050405020304" pitchFamily="18" charset="0"/>
-                <a:cs typeface="Times New Roman" panose="02020603050405020304" pitchFamily="18" charset="0"/>
-              </a:endParaRPr>
             </a:p>
           </p:txBody>
         </p:sp>
@@ -8380,7 +8169,7 @@
           </p:nvSpPr>
           <p:spPr>
             <a:xfrm>
-              <a:off x="16949686" y="27601729"/>
+              <a:off x="16949686" y="28528827"/>
               <a:ext cx="4492697" cy="553998"/>
             </a:xfrm>
             <a:prstGeom prst="rect">
@@ -8402,10 +8191,6 @@
                 </a:rPr>
                 <a:t>(c) Bottom Switch Turn-Off</a:t>
               </a:r>
-              <a:endParaRPr lang="tr-TR" sz="3000" dirty="0" smtClean="0">
-                <a:latin typeface="Times New Roman" panose="02020603050405020304" pitchFamily="18" charset="0"/>
-                <a:cs typeface="Times New Roman" panose="02020603050405020304" pitchFamily="18" charset="0"/>
-              </a:endParaRPr>
             </a:p>
           </p:txBody>
         </p:sp>
@@ -8417,7 +8202,7 @@
           </p:nvSpPr>
           <p:spPr>
             <a:xfrm>
-              <a:off x="23836035" y="27596057"/>
+              <a:off x="24068259" y="28523155"/>
               <a:ext cx="4492697" cy="553998"/>
             </a:xfrm>
             <a:prstGeom prst="rect">
@@ -8439,10 +8224,6 @@
                 </a:rPr>
                 <a:t>(d) Bottom Switch Turn-On</a:t>
               </a:r>
-              <a:endParaRPr lang="tr-TR" sz="3000" dirty="0" smtClean="0">
-                <a:latin typeface="Times New Roman" panose="02020603050405020304" pitchFamily="18" charset="0"/>
-                <a:cs typeface="Times New Roman" panose="02020603050405020304" pitchFamily="18" charset="0"/>
-              </a:endParaRPr>
             </a:p>
           </p:txBody>
         </p:sp>
@@ -8454,7 +8235,7 @@
           </p:nvSpPr>
           <p:spPr>
             <a:xfrm>
-              <a:off x="15680588" y="28074499"/>
+              <a:off x="15680588" y="28930841"/>
               <a:ext cx="14037411" cy="553998"/>
             </a:xfrm>
             <a:prstGeom prst="rect">
@@ -8469,32 +8250,25 @@
             <a:lstStyle/>
             <a:p>
               <a:r>
+                <a:rPr lang="en-US" sz="3000" dirty="0" smtClean="0">
+                  <a:latin typeface="Times New Roman" panose="02020603050405020304" pitchFamily="18" charset="0"/>
+                  <a:cs typeface="Times New Roman" panose="02020603050405020304" pitchFamily="18" charset="0"/>
+                </a:rPr>
+                <a:t>Switching </a:t>
+              </a:r>
+              <a:r>
                 <a:rPr lang="en-US" sz="3000" dirty="0">
                   <a:latin typeface="Times New Roman" panose="02020603050405020304" pitchFamily="18" charset="0"/>
                   <a:cs typeface="Times New Roman" panose="02020603050405020304" pitchFamily="18" charset="0"/>
                 </a:rPr>
-                <a:t>Fig. </a:t>
-              </a:r>
-              <a:r>
-                <a:rPr lang="tr-TR" sz="3000" dirty="0" smtClean="0">
-                  <a:latin typeface="Times New Roman" panose="02020603050405020304" pitchFamily="18" charset="0"/>
-                  <a:cs typeface="Times New Roman" panose="02020603050405020304" pitchFamily="18" charset="0"/>
-                </a:rPr>
-                <a:t>10</a:t>
+                <a:t>characteristics </a:t>
               </a:r>
               <a:r>
                 <a:rPr lang="en-US" sz="3000" dirty="0" smtClean="0">
                   <a:latin typeface="Times New Roman" panose="02020603050405020304" pitchFamily="18" charset="0"/>
                   <a:cs typeface="Times New Roman" panose="02020603050405020304" pitchFamily="18" charset="0"/>
                 </a:rPr>
-                <a:t>: </a:t>
-              </a:r>
-              <a:r>
-                <a:rPr lang="en-US" sz="3000" dirty="0">
-                  <a:latin typeface="Times New Roman" panose="02020603050405020304" pitchFamily="18" charset="0"/>
-                  <a:cs typeface="Times New Roman" panose="02020603050405020304" pitchFamily="18" charset="0"/>
-                </a:rPr>
-                <a:t>Switching characteristics as state trajectories for </a:t>
+                <a:t>for </a:t>
               </a:r>
               <a:r>
                 <a:rPr lang="tr-TR" sz="3000" dirty="0" smtClean="0">
@@ -8540,8 +8314,8 @@
         </p:nvSpPr>
         <p:spPr>
           <a:xfrm>
-            <a:off x="15970567" y="21912532"/>
-            <a:ext cx="13356985" cy="2308324"/>
+            <a:off x="15970567" y="22591974"/>
+            <a:ext cx="13356985" cy="1200329"/>
           </a:xfrm>
           <a:prstGeom prst="rect">
             <a:avLst/>
@@ -8563,7 +8337,21 @@
                 <a:latin typeface="Times New Roman" panose="02020603050405020304" pitchFamily="18" charset="0"/>
                 <a:cs typeface="Times New Roman" panose="02020603050405020304" pitchFamily="18" charset="0"/>
               </a:rPr>
-              <a:t>The gate-voltage level changes dramatically with current level as seen in (a)</a:t>
+              <a:t>The </a:t>
+            </a:r>
+            <a:r>
+              <a:rPr lang="tr-TR" sz="3600" b="1" dirty="0" smtClean="0">
+                <a:latin typeface="Times New Roman" panose="02020603050405020304" pitchFamily="18" charset="0"/>
+                <a:cs typeface="Times New Roman" panose="02020603050405020304" pitchFamily="18" charset="0"/>
+              </a:rPr>
+              <a:t>gate-voltage level changes</a:t>
+            </a:r>
+            <a:r>
+              <a:rPr lang="tr-TR" sz="3600" dirty="0" smtClean="0">
+                <a:latin typeface="Times New Roman" panose="02020603050405020304" pitchFamily="18" charset="0"/>
+                <a:cs typeface="Times New Roman" panose="02020603050405020304" pitchFamily="18" charset="0"/>
+              </a:rPr>
+              <a:t> dramatically with current level </a:t>
             </a:r>
           </a:p>
           <a:p>
@@ -8576,7 +8364,28 @@
                 <a:latin typeface="Times New Roman" panose="02020603050405020304" pitchFamily="18" charset="0"/>
                 <a:cs typeface="Times New Roman" panose="02020603050405020304" pitchFamily="18" charset="0"/>
               </a:rPr>
-              <a:t>As shown in (d), the voltage dip level is the same for all current levels because the transition speed is the same for all conditions</a:t>
+              <a:t>The </a:t>
+            </a:r>
+            <a:r>
+              <a:rPr lang="tr-TR" sz="3600" b="1" dirty="0" smtClean="0">
+                <a:latin typeface="Times New Roman" panose="02020603050405020304" pitchFamily="18" charset="0"/>
+                <a:cs typeface="Times New Roman" panose="02020603050405020304" pitchFamily="18" charset="0"/>
+              </a:rPr>
+              <a:t>voltage dip level is the same </a:t>
+            </a:r>
+            <a:r>
+              <a:rPr lang="tr-TR" sz="3600" dirty="0" smtClean="0">
+                <a:latin typeface="Times New Roman" panose="02020603050405020304" pitchFamily="18" charset="0"/>
+                <a:cs typeface="Times New Roman" panose="02020603050405020304" pitchFamily="18" charset="0"/>
+              </a:rPr>
+              <a:t>for all current </a:t>
+            </a:r>
+            <a:r>
+              <a:rPr lang="tr-TR" sz="3600" dirty="0" smtClean="0">
+                <a:latin typeface="Times New Roman" panose="02020603050405020304" pitchFamily="18" charset="0"/>
+                <a:cs typeface="Times New Roman" panose="02020603050405020304" pitchFamily="18" charset="0"/>
+              </a:rPr>
+              <a:t>levels</a:t>
             </a:r>
             <a:endParaRPr lang="tr-TR" sz="3600" dirty="0" smtClean="0">
               <a:latin typeface="Times New Roman" panose="02020603050405020304" pitchFamily="18" charset="0"/>
@@ -8595,7 +8404,7 @@
         </p:nvSpPr>
         <p:spPr bwMode="auto">
           <a:xfrm>
-            <a:off x="18945225" y="31116165"/>
+            <a:off x="18945225" y="30444500"/>
             <a:ext cx="7372350" cy="830997"/>
           </a:xfrm>
           <a:prstGeom prst="rect">
@@ -8637,8 +8446,8 @@
         </p:nvSpPr>
         <p:spPr>
           <a:xfrm>
-            <a:off x="15970567" y="31913435"/>
-            <a:ext cx="13356985" cy="4524315"/>
+            <a:off x="15970567" y="31278025"/>
+            <a:ext cx="13356985" cy="5078313"/>
           </a:xfrm>
           <a:prstGeom prst="rect">
             <a:avLst/>
@@ -8651,7 +8460,10 @@
           </a:bodyPr>
           <a:lstStyle/>
           <a:p>
-            <a:pPr algn="just"/>
+            <a:pPr marL="571500" indent="-571500" algn="just">
+              <a:buFont typeface="Wingdings" panose="05000000000000000000" pitchFamily="2" charset="2"/>
+              <a:buChar char="Ø"/>
+            </a:pPr>
             <a:r>
               <a:rPr lang="tr-TR" sz="3600" dirty="0" smtClean="0">
                 <a:latin typeface="Times New Roman" panose="02020603050405020304" pitchFamily="18" charset="0"/>
@@ -8686,111 +8498,6 @@
                 <a:cs typeface="Times New Roman" panose="02020603050405020304" pitchFamily="18" charset="0"/>
               </a:rPr>
               <a:t>. </a:t>
-            </a:r>
-            <a:r>
-              <a:rPr lang="en-US" sz="3600" dirty="0">
-                <a:latin typeface="Times New Roman" panose="02020603050405020304" pitchFamily="18" charset="0"/>
-                <a:cs typeface="Times New Roman" panose="02020603050405020304" pitchFamily="18" charset="0"/>
-              </a:rPr>
-              <a:t>The simulation results </a:t>
-            </a:r>
-            <a:r>
-              <a:rPr lang="en-US" sz="3600" dirty="0" smtClean="0">
-                <a:latin typeface="Times New Roman" panose="02020603050405020304" pitchFamily="18" charset="0"/>
-                <a:cs typeface="Times New Roman" panose="02020603050405020304" pitchFamily="18" charset="0"/>
-              </a:rPr>
-              <a:t>are </a:t>
-            </a:r>
-            <a:r>
-              <a:rPr lang="en-US" sz="3600" dirty="0">
-                <a:latin typeface="Times New Roman" panose="02020603050405020304" pitchFamily="18" charset="0"/>
-                <a:cs typeface="Times New Roman" panose="02020603050405020304" pitchFamily="18" charset="0"/>
-              </a:rPr>
-              <a:t>presented as state-trajectories on the steady state I</a:t>
-            </a:r>
-            <a:r>
-              <a:rPr lang="en-US" sz="3600" baseline="-25000" dirty="0">
-                <a:latin typeface="Times New Roman" panose="02020603050405020304" pitchFamily="18" charset="0"/>
-                <a:cs typeface="Times New Roman" panose="02020603050405020304" pitchFamily="18" charset="0"/>
-              </a:rPr>
-              <a:t>ds</a:t>
-            </a:r>
-            <a:r>
-              <a:rPr lang="en-US" sz="3600" dirty="0">
-                <a:latin typeface="Times New Roman" panose="02020603050405020304" pitchFamily="18" charset="0"/>
-                <a:cs typeface="Times New Roman" panose="02020603050405020304" pitchFamily="18" charset="0"/>
-              </a:rPr>
-              <a:t> – V</a:t>
-            </a:r>
-            <a:r>
-              <a:rPr lang="en-US" sz="3600" baseline="-25000" dirty="0">
-                <a:latin typeface="Times New Roman" panose="02020603050405020304" pitchFamily="18" charset="0"/>
-                <a:cs typeface="Times New Roman" panose="02020603050405020304" pitchFamily="18" charset="0"/>
-              </a:rPr>
-              <a:t>ds</a:t>
-            </a:r>
-            <a:r>
-              <a:rPr lang="en-US" sz="3600" dirty="0">
-                <a:latin typeface="Times New Roman" panose="02020603050405020304" pitchFamily="18" charset="0"/>
-                <a:cs typeface="Times New Roman" panose="02020603050405020304" pitchFamily="18" charset="0"/>
-              </a:rPr>
-              <a:t> graph to discuss characteristics better. </a:t>
-            </a:r>
-            <a:r>
-              <a:rPr lang="tr-TR" sz="3600" dirty="0" smtClean="0">
-                <a:latin typeface="Times New Roman" panose="02020603050405020304" pitchFamily="18" charset="0"/>
-                <a:cs typeface="Times New Roman" panose="02020603050405020304" pitchFamily="18" charset="0"/>
-              </a:rPr>
-              <a:t>In </a:t>
-            </a:r>
-            <a:r>
-              <a:rPr lang="en-US" sz="3600" dirty="0" smtClean="0">
-                <a:latin typeface="Times New Roman" panose="02020603050405020304" pitchFamily="18" charset="0"/>
-                <a:cs typeface="Times New Roman" panose="02020603050405020304" pitchFamily="18" charset="0"/>
-              </a:rPr>
-              <a:t>order </a:t>
-            </a:r>
-            <a:r>
-              <a:rPr lang="en-US" sz="3600" dirty="0">
-                <a:latin typeface="Times New Roman" panose="02020603050405020304" pitchFamily="18" charset="0"/>
-                <a:cs typeface="Times New Roman" panose="02020603050405020304" pitchFamily="18" charset="0"/>
-              </a:rPr>
-              <a:t>to </a:t>
-            </a:r>
-            <a:r>
-              <a:rPr lang="en-US" sz="3600" dirty="0" smtClean="0">
-                <a:latin typeface="Times New Roman" panose="02020603050405020304" pitchFamily="18" charset="0"/>
-                <a:cs typeface="Times New Roman" panose="02020603050405020304" pitchFamily="18" charset="0"/>
-              </a:rPr>
-              <a:t>express </a:t>
-            </a:r>
-            <a:r>
-              <a:rPr lang="en-US" sz="3600" dirty="0">
-                <a:latin typeface="Times New Roman" panose="02020603050405020304" pitchFamily="18" charset="0"/>
-                <a:cs typeface="Times New Roman" panose="02020603050405020304" pitchFamily="18" charset="0"/>
-              </a:rPr>
-              <a:t>the unique conduction characteristics of GaN better</a:t>
-            </a:r>
-            <a:r>
-              <a:rPr lang="en-US" sz="3600" dirty="0" smtClean="0">
-                <a:latin typeface="Times New Roman" panose="02020603050405020304" pitchFamily="18" charset="0"/>
-                <a:cs typeface="Times New Roman" panose="02020603050405020304" pitchFamily="18" charset="0"/>
-              </a:rPr>
-              <a:t>, </a:t>
-            </a:r>
-            <a:r>
-              <a:rPr lang="en-US" sz="3600" dirty="0">
-                <a:latin typeface="Times New Roman" panose="02020603050405020304" pitchFamily="18" charset="0"/>
-                <a:cs typeface="Times New Roman" panose="02020603050405020304" pitchFamily="18" charset="0"/>
-              </a:rPr>
-              <a:t>active/passive turn-on/off, are explained</a:t>
-            </a:r>
-            <a:r>
-              <a:rPr lang="en-US" sz="3600" dirty="0" smtClean="0">
-                <a:latin typeface="Times New Roman" panose="02020603050405020304" pitchFamily="18" charset="0"/>
-                <a:cs typeface="Times New Roman" panose="02020603050405020304" pitchFamily="18" charset="0"/>
-              </a:rPr>
-              <a:t>.</a:t>
             </a:r>
             <a:endParaRPr lang="tr-TR" sz="3600" dirty="0" smtClean="0">
               <a:latin typeface="Times New Roman" panose="02020603050405020304" pitchFamily="18" charset="0"/>
@@ -8798,83 +8505,266 @@
             </a:endParaRPr>
           </a:p>
           <a:p>
-            <a:pPr algn="just"/>
+            <a:pPr marL="571500" indent="-571500" algn="just">
+              <a:buFont typeface="Wingdings" panose="05000000000000000000" pitchFamily="2" charset="2"/>
+              <a:buChar char="Ø"/>
+            </a:pPr>
+            <a:r>
+              <a:rPr lang="tr-TR" sz="3600" dirty="0" smtClean="0">
+                <a:latin typeface="Times New Roman" panose="02020603050405020304" pitchFamily="18" charset="0"/>
+                <a:cs typeface="Times New Roman" panose="02020603050405020304" pitchFamily="18" charset="0"/>
+              </a:rPr>
+              <a:t>In </a:t>
+            </a:r>
+            <a:r>
+              <a:rPr lang="en-US" sz="3600" dirty="0" smtClean="0">
+                <a:latin typeface="Times New Roman" panose="02020603050405020304" pitchFamily="18" charset="0"/>
+                <a:cs typeface="Times New Roman" panose="02020603050405020304" pitchFamily="18" charset="0"/>
+              </a:rPr>
+              <a:t>order </a:t>
+            </a:r>
             <a:r>
               <a:rPr lang="en-US" sz="3600" dirty="0">
                 <a:latin typeface="Times New Roman" panose="02020603050405020304" pitchFamily="18" charset="0"/>
                 <a:cs typeface="Times New Roman" panose="02020603050405020304" pitchFamily="18" charset="0"/>
               </a:rPr>
-              <a:t>Furthermore, </a:t>
+              <a:t>to </a:t>
+            </a:r>
+            <a:r>
+              <a:rPr lang="en-US" sz="3600" dirty="0" smtClean="0">
+                <a:latin typeface="Times New Roman" panose="02020603050405020304" pitchFamily="18" charset="0"/>
+                <a:cs typeface="Times New Roman" panose="02020603050405020304" pitchFamily="18" charset="0"/>
+              </a:rPr>
+              <a:t>express </a:t>
+            </a:r>
+            <a:r>
+              <a:rPr lang="en-US" sz="3600" dirty="0">
+                <a:latin typeface="Times New Roman" panose="02020603050405020304" pitchFamily="18" charset="0"/>
+                <a:cs typeface="Times New Roman" panose="02020603050405020304" pitchFamily="18" charset="0"/>
+              </a:rPr>
+              <a:t>the unique conduction characteristics of GaN better</a:t>
+            </a:r>
+            <a:r>
+              <a:rPr lang="en-US" sz="3600" dirty="0" smtClean="0">
+                <a:latin typeface="Times New Roman" panose="02020603050405020304" pitchFamily="18" charset="0"/>
+                <a:cs typeface="Times New Roman" panose="02020603050405020304" pitchFamily="18" charset="0"/>
+              </a:rPr>
+              <a:t>, </a:t>
+            </a:r>
+            <a:r>
+              <a:rPr lang="en-US" sz="3600" dirty="0">
+                <a:latin typeface="Times New Roman" panose="02020603050405020304" pitchFamily="18" charset="0"/>
+                <a:cs typeface="Times New Roman" panose="02020603050405020304" pitchFamily="18" charset="0"/>
+              </a:rPr>
+              <a:t>active/passive turn-on/off, are </a:t>
+            </a:r>
+            <a:r>
+              <a:rPr lang="en-US" sz="3600" dirty="0" smtClean="0">
+                <a:latin typeface="Times New Roman" panose="02020603050405020304" pitchFamily="18" charset="0"/>
+                <a:cs typeface="Times New Roman" panose="02020603050405020304" pitchFamily="18" charset="0"/>
+              </a:rPr>
+              <a:t>explained.</a:t>
+            </a:r>
+            <a:endParaRPr lang="tr-TR" sz="3600" dirty="0">
+              <a:latin typeface="Times New Roman" panose="02020603050405020304" pitchFamily="18" charset="0"/>
+              <a:cs typeface="Times New Roman" panose="02020603050405020304" pitchFamily="18" charset="0"/>
+            </a:endParaRPr>
+          </a:p>
+          <a:p>
+            <a:pPr marL="571500" indent="-571500" algn="just">
+              <a:buFont typeface="Wingdings" panose="05000000000000000000" pitchFamily="2" charset="2"/>
+              <a:buChar char="Ø"/>
+            </a:pPr>
+            <a:r>
+              <a:rPr lang="tr-TR" sz="3600" dirty="0" smtClean="0">
+                <a:latin typeface="Times New Roman" panose="02020603050405020304" pitchFamily="18" charset="0"/>
+                <a:cs typeface="Times New Roman" panose="02020603050405020304" pitchFamily="18" charset="0"/>
+              </a:rPr>
+              <a:t>I</a:t>
+            </a:r>
+            <a:r>
+              <a:rPr lang="en-US" sz="3600" dirty="0" smtClean="0">
+                <a:latin typeface="Times New Roman" panose="02020603050405020304" pitchFamily="18" charset="0"/>
+                <a:cs typeface="Times New Roman" panose="02020603050405020304" pitchFamily="18" charset="0"/>
+              </a:rPr>
+              <a:t>t </a:t>
+            </a:r>
+            <a:r>
+              <a:rPr lang="en-US" sz="3600" dirty="0">
+                <a:latin typeface="Times New Roman" panose="02020603050405020304" pitchFamily="18" charset="0"/>
+                <a:cs typeface="Times New Roman" panose="02020603050405020304" pitchFamily="18" charset="0"/>
+              </a:rPr>
+              <a:t>is shown that increasing operation temperature reduces trans-conductance </a:t>
+            </a:r>
+            <a:r>
+              <a:rPr lang="en-US" sz="3600" dirty="0" smtClean="0">
+                <a:latin typeface="Times New Roman" panose="02020603050405020304" pitchFamily="18" charset="0"/>
+                <a:cs typeface="Times New Roman" panose="02020603050405020304" pitchFamily="18" charset="0"/>
+              </a:rPr>
+              <a:t>significantly</a:t>
+            </a:r>
+            <a:r>
+              <a:rPr lang="tr-TR" sz="3600" dirty="0" smtClean="0">
+                <a:latin typeface="Times New Roman" panose="02020603050405020304" pitchFamily="18" charset="0"/>
+                <a:cs typeface="Times New Roman" panose="02020603050405020304" pitchFamily="18" charset="0"/>
+              </a:rPr>
+              <a:t>, i.e. halved for every 75</a:t>
+            </a:r>
+            <a:r>
+              <a:rPr lang="en-GB" sz="3600" dirty="0" smtClean="0">
+                <a:latin typeface="Times New Roman" panose="02020603050405020304" pitchFamily="18" charset="0"/>
+                <a:cs typeface="Times New Roman" panose="02020603050405020304" pitchFamily="18" charset="0"/>
+              </a:rPr>
+              <a:t>ºC</a:t>
+            </a:r>
+            <a:r>
+              <a:rPr lang="tr-TR" sz="3600" dirty="0" smtClean="0">
+                <a:latin typeface="Times New Roman" panose="02020603050405020304" pitchFamily="18" charset="0"/>
+                <a:cs typeface="Times New Roman" panose="02020603050405020304" pitchFamily="18" charset="0"/>
+              </a:rPr>
+              <a:t> increase</a:t>
+            </a:r>
+            <a:endParaRPr lang="tr-TR" sz="3600" dirty="0" smtClean="0">
+              <a:latin typeface="Times New Roman" panose="02020603050405020304" pitchFamily="18" charset="0"/>
+              <a:cs typeface="Times New Roman" panose="02020603050405020304" pitchFamily="18" charset="0"/>
+            </a:endParaRPr>
+          </a:p>
+          <a:p>
+            <a:pPr marL="571500" indent="-571500" algn="just">
+              <a:buFont typeface="Wingdings" panose="05000000000000000000" pitchFamily="2" charset="2"/>
+              <a:buChar char="Ø"/>
+            </a:pPr>
+            <a:r>
+              <a:rPr lang="tr-TR" sz="3600" dirty="0" smtClean="0">
+                <a:latin typeface="Times New Roman" panose="02020603050405020304" pitchFamily="18" charset="0"/>
+                <a:cs typeface="Times New Roman" panose="02020603050405020304" pitchFamily="18" charset="0"/>
+              </a:rPr>
+              <a:t>G</a:t>
+            </a:r>
+            <a:r>
+              <a:rPr lang="en-US" sz="3600" dirty="0" smtClean="0">
+                <a:latin typeface="Times New Roman" panose="02020603050405020304" pitchFamily="18" charset="0"/>
+                <a:cs typeface="Times New Roman" panose="02020603050405020304" pitchFamily="18" charset="0"/>
+              </a:rPr>
+              <a:t>ate-source </a:t>
+            </a:r>
+            <a:r>
+              <a:rPr lang="en-US" sz="3600" dirty="0">
+                <a:latin typeface="Times New Roman" panose="02020603050405020304" pitchFamily="18" charset="0"/>
+                <a:cs typeface="Times New Roman" panose="02020603050405020304" pitchFamily="18" charset="0"/>
+              </a:rPr>
+              <a:t>voltage is affected by </a:t>
+            </a:r>
+            <a:r>
+              <a:rPr lang="en-US" sz="3600" dirty="0" smtClean="0">
+                <a:latin typeface="Times New Roman" panose="02020603050405020304" pitchFamily="18" charset="0"/>
+                <a:cs typeface="Times New Roman" panose="02020603050405020304" pitchFamily="18" charset="0"/>
+              </a:rPr>
+              <a:t>the</a:t>
+            </a:r>
+            <a:r>
+              <a:rPr lang="tr-TR" sz="3600" dirty="0" smtClean="0">
+                <a:latin typeface="Times New Roman" panose="02020603050405020304" pitchFamily="18" charset="0"/>
+                <a:cs typeface="Times New Roman" panose="02020603050405020304" pitchFamily="18" charset="0"/>
+              </a:rPr>
+              <a:t> drain-source</a:t>
+            </a:r>
+            <a:r>
+              <a:rPr lang="en-US" sz="3600" dirty="0" smtClean="0">
+                <a:latin typeface="Times New Roman" panose="02020603050405020304" pitchFamily="18" charset="0"/>
+                <a:cs typeface="Times New Roman" panose="02020603050405020304" pitchFamily="18" charset="0"/>
+              </a:rPr>
+              <a:t> current</a:t>
+            </a:r>
+            <a:r>
+              <a:rPr lang="tr-TR" sz="3600" dirty="0" smtClean="0">
+                <a:latin typeface="Times New Roman" panose="02020603050405020304" pitchFamily="18" charset="0"/>
+                <a:cs typeface="Times New Roman" panose="02020603050405020304" pitchFamily="18" charset="0"/>
+              </a:rPr>
+              <a:t> level</a:t>
+            </a:r>
+            <a:r>
+              <a:rPr lang="en-US" sz="3600" dirty="0" smtClean="0">
+                <a:latin typeface="Times New Roman" panose="02020603050405020304" pitchFamily="18" charset="0"/>
+                <a:cs typeface="Times New Roman" panose="02020603050405020304" pitchFamily="18" charset="0"/>
+              </a:rPr>
+              <a:t> </a:t>
+            </a:r>
+            <a:r>
+              <a:rPr lang="tr-TR" sz="3600" dirty="0" smtClean="0">
+                <a:latin typeface="Times New Roman" panose="02020603050405020304" pitchFamily="18" charset="0"/>
+                <a:cs typeface="Times New Roman" panose="02020603050405020304" pitchFamily="18" charset="0"/>
+              </a:rPr>
+              <a:t>during the transition while</a:t>
+            </a:r>
+            <a:r>
+              <a:rPr lang="en-US" sz="3600" dirty="0" smtClean="0">
+                <a:latin typeface="Times New Roman" panose="02020603050405020304" pitchFamily="18" charset="0"/>
+                <a:cs typeface="Times New Roman" panose="02020603050405020304" pitchFamily="18" charset="0"/>
+              </a:rPr>
+              <a:t> </a:t>
+            </a:r>
+            <a:r>
+              <a:rPr lang="en-US" sz="3600" dirty="0">
+                <a:latin typeface="Times New Roman" panose="02020603050405020304" pitchFamily="18" charset="0"/>
+                <a:cs typeface="Times New Roman" panose="02020603050405020304" pitchFamily="18" charset="0"/>
+              </a:rPr>
+              <a:t>the switching speed </a:t>
+            </a:r>
+            <a:r>
+              <a:rPr lang="en-US" sz="3600" dirty="0" smtClean="0">
+                <a:latin typeface="Times New Roman" panose="02020603050405020304" pitchFamily="18" charset="0"/>
+                <a:cs typeface="Times New Roman" panose="02020603050405020304" pitchFamily="18" charset="0"/>
+              </a:rPr>
+              <a:t>is</a:t>
             </a:r>
             <a:r>
               <a:rPr lang="tr-TR" sz="3600" dirty="0">
                 <a:latin typeface="Times New Roman" panose="02020603050405020304" pitchFamily="18" charset="0"/>
                 <a:cs typeface="Times New Roman" panose="02020603050405020304" pitchFamily="18" charset="0"/>
               </a:rPr>
-              <a:t>i</a:t>
+              <a:t> </a:t>
+            </a:r>
+            <a:r>
+              <a:rPr lang="tr-TR" sz="3600" dirty="0" smtClean="0">
+                <a:latin typeface="Times New Roman" panose="02020603050405020304" pitchFamily="18" charset="0"/>
+                <a:cs typeface="Times New Roman" panose="02020603050405020304" pitchFamily="18" charset="0"/>
+              </a:rPr>
+              <a:t>no</a:t>
+            </a:r>
+            <a:r>
+              <a:rPr lang="tr-TR" sz="3600" dirty="0" smtClean="0">
+                <a:latin typeface="Times New Roman" panose="02020603050405020304" pitchFamily="18" charset="0"/>
+                <a:cs typeface="Times New Roman" panose="02020603050405020304" pitchFamily="18" charset="0"/>
+              </a:rPr>
+              <a:t>t </a:t>
             </a:r>
             <a:r>
               <a:rPr lang="en-US" sz="3600" dirty="0" smtClean="0">
                 <a:latin typeface="Times New Roman" panose="02020603050405020304" pitchFamily="18" charset="0"/>
                 <a:cs typeface="Times New Roman" panose="02020603050405020304" pitchFamily="18" charset="0"/>
               </a:rPr>
-              <a:t>t </a:t>
-            </a:r>
-            <a:r>
-              <a:rPr lang="en-US" sz="3600" dirty="0">
-                <a:latin typeface="Times New Roman" panose="02020603050405020304" pitchFamily="18" charset="0"/>
-                <a:cs typeface="Times New Roman" panose="02020603050405020304" pitchFamily="18" charset="0"/>
-              </a:rPr>
-              <a:t>is shown that increasing operation temperature reduces trans-conductance </a:t>
-            </a:r>
-            <a:r>
-              <a:rPr lang="en-US" sz="3600" dirty="0" smtClean="0">
-                <a:latin typeface="Times New Roman" panose="02020603050405020304" pitchFamily="18" charset="0"/>
-                <a:cs typeface="Times New Roman" panose="02020603050405020304" pitchFamily="18" charset="0"/>
-              </a:rPr>
-              <a:t>significantly</a:t>
+              <a:t>changed</a:t>
             </a:r>
             <a:r>
               <a:rPr lang="tr-TR" sz="3600" dirty="0" smtClean="0">
                 <a:latin typeface="Times New Roman" panose="02020603050405020304" pitchFamily="18" charset="0"/>
                 <a:cs typeface="Times New Roman" panose="02020603050405020304" pitchFamily="18" charset="0"/>
               </a:rPr>
-              <a:t>. </a:t>
-            </a:r>
-            <a:r>
-              <a:rPr lang="en-US" sz="3600" dirty="0">
-                <a:latin typeface="Times New Roman" panose="02020603050405020304" pitchFamily="18" charset="0"/>
-                <a:cs typeface="Times New Roman" panose="02020603050405020304" pitchFamily="18" charset="0"/>
-              </a:rPr>
-              <a:t>Additionally, </a:t>
-            </a:r>
-            <a:r>
-              <a:rPr lang="en-US" sz="3600" dirty="0" smtClean="0">
-                <a:latin typeface="Times New Roman" panose="02020603050405020304" pitchFamily="18" charset="0"/>
-                <a:cs typeface="Times New Roman" panose="02020603050405020304" pitchFamily="18" charset="0"/>
-              </a:rPr>
-              <a:t>it </a:t>
-            </a:r>
-            <a:r>
-              <a:rPr lang="en-US" sz="3600" dirty="0">
-                <a:latin typeface="Times New Roman" panose="02020603050405020304" pitchFamily="18" charset="0"/>
-                <a:cs typeface="Times New Roman" panose="02020603050405020304" pitchFamily="18" charset="0"/>
-              </a:rPr>
-              <a:t>is shown that the transient gate-source voltage is affected by the current whereas the switching speed is not changed as </a:t>
-            </a:r>
-            <a:r>
-              <a:rPr lang="en-US" sz="3600" dirty="0" smtClean="0">
-                <a:latin typeface="Times New Roman" panose="02020603050405020304" pitchFamily="18" charset="0"/>
-                <a:cs typeface="Times New Roman" panose="02020603050405020304" pitchFamily="18" charset="0"/>
-              </a:rPr>
-              <a:t>expected</a:t>
-            </a:r>
+              <a:t>.</a:t>
+            </a:r>
+          </a:p>
+          <a:p>
+            <a:pPr marL="571500" indent="-571500" algn="just">
+              <a:buFont typeface="Wingdings" panose="05000000000000000000" pitchFamily="2" charset="2"/>
+              <a:buChar char="Ø"/>
+            </a:pPr>
             <a:r>
               <a:rPr lang="tr-TR" sz="3600" dirty="0" smtClean="0">
                 <a:latin typeface="Times New Roman" panose="02020603050405020304" pitchFamily="18" charset="0"/>
                 <a:cs typeface="Times New Roman" panose="02020603050405020304" pitchFamily="18" charset="0"/>
               </a:rPr>
-              <a:t>.</a:t>
+              <a:t>Turn-on/off resistors changes Ciss charging/discharging time, so the overshoot amplitudes and switching losses are affected</a:t>
             </a:r>
             <a:endParaRPr lang="tr-TR" sz="3600" dirty="0" smtClean="0">
               <a:latin typeface="Times New Roman" panose="02020603050405020304" pitchFamily="18" charset="0"/>
@@ -9194,7 +9084,7 @@
         <p:spPr bwMode="auto">
           <a:xfrm>
             <a:off x="1481895" y="2211489"/>
-            <a:ext cx="5400000" cy="4320000"/>
+            <a:ext cx="5760000" cy="4680000"/>
           </a:xfrm>
           <a:prstGeom prst="rect">
             <a:avLst/>
@@ -9230,7 +9120,7 @@
         <p:spPr bwMode="auto">
           <a:xfrm>
             <a:off x="8075637" y="2211489"/>
-            <a:ext cx="5400000" cy="4320000"/>
+            <a:ext cx="5760000" cy="4680000"/>
           </a:xfrm>
           <a:prstGeom prst="rect">
             <a:avLst/>
@@ -9254,7 +9144,7 @@
         </p:nvSpPr>
         <p:spPr>
           <a:xfrm>
-            <a:off x="1854345" y="6423227"/>
+            <a:off x="1854345" y="6954173"/>
             <a:ext cx="4492697" cy="553998"/>
           </a:xfrm>
           <a:prstGeom prst="rect">
@@ -9276,10 +9166,6 @@
               </a:rPr>
               <a:t>(c) Bottom Switch Turn-Off</a:t>
             </a:r>
-            <a:endParaRPr lang="tr-TR" sz="3000" dirty="0" smtClean="0">
-              <a:latin typeface="Times New Roman" panose="02020603050405020304" pitchFamily="18" charset="0"/>
-              <a:cs typeface="Times New Roman" panose="02020603050405020304" pitchFamily="18" charset="0"/>
-            </a:endParaRPr>
           </a:p>
         </p:txBody>
       </p:sp>
@@ -9291,7 +9177,7 @@
         </p:nvSpPr>
         <p:spPr>
           <a:xfrm>
-            <a:off x="8827982" y="6424684"/>
+            <a:off x="8827982" y="6955630"/>
             <a:ext cx="4492697" cy="553998"/>
           </a:xfrm>
           <a:prstGeom prst="rect">
@@ -9313,10 +9199,6 @@
               </a:rPr>
               <a:t>(d) Bottom Switch Turn-On</a:t>
             </a:r>
-            <a:endParaRPr lang="tr-TR" sz="3000" dirty="0" smtClean="0">
-              <a:latin typeface="Times New Roman" panose="02020603050405020304" pitchFamily="18" charset="0"/>
-              <a:cs typeface="Times New Roman" panose="02020603050405020304" pitchFamily="18" charset="0"/>
-            </a:endParaRPr>
           </a:p>
         </p:txBody>
       </p:sp>
@@ -9328,7 +9210,7 @@
         </p:nvSpPr>
         <p:spPr>
           <a:xfrm>
-            <a:off x="1003719" y="7147750"/>
+            <a:off x="2013590" y="7589777"/>
             <a:ext cx="11756351" cy="553998"/>
           </a:xfrm>
           <a:prstGeom prst="rect">
@@ -9343,32 +9225,32 @@
           <a:lstStyle/>
           <a:p>
             <a:r>
+              <a:rPr lang="en-US" sz="3000" dirty="0" smtClean="0">
+                <a:latin typeface="Times New Roman" panose="02020603050405020304" pitchFamily="18" charset="0"/>
+                <a:cs typeface="Times New Roman" panose="02020603050405020304" pitchFamily="18" charset="0"/>
+              </a:rPr>
+              <a:t>Switching </a:t>
+            </a:r>
+            <a:r>
+              <a:rPr lang="tr-TR" sz="3000" dirty="0" smtClean="0">
+                <a:latin typeface="Times New Roman" panose="02020603050405020304" pitchFamily="18" charset="0"/>
+                <a:cs typeface="Times New Roman" panose="02020603050405020304" pitchFamily="18" charset="0"/>
+              </a:rPr>
+              <a:t>waveforms</a:t>
+            </a:r>
+            <a:r>
+              <a:rPr lang="en-US" sz="3000" dirty="0" smtClean="0">
+                <a:latin typeface="Times New Roman" panose="02020603050405020304" pitchFamily="18" charset="0"/>
+                <a:cs typeface="Times New Roman" panose="02020603050405020304" pitchFamily="18" charset="0"/>
+              </a:rPr>
+              <a:t> obtained </a:t>
+            </a:r>
+            <a:r>
               <a:rPr lang="en-US" sz="3000" dirty="0">
                 <a:latin typeface="Times New Roman" panose="02020603050405020304" pitchFamily="18" charset="0"/>
                 <a:cs typeface="Times New Roman" panose="02020603050405020304" pitchFamily="18" charset="0"/>
               </a:rPr>
-              <a:t>Fig. </a:t>
-            </a:r>
-            <a:r>
-              <a:rPr lang="tr-TR" sz="3000" dirty="0" smtClean="0">
-                <a:latin typeface="Times New Roman" panose="02020603050405020304" pitchFamily="18" charset="0"/>
-                <a:cs typeface="Times New Roman" panose="02020603050405020304" pitchFamily="18" charset="0"/>
-              </a:rPr>
-              <a:t>6</a:t>
-            </a:r>
-            <a:r>
-              <a:rPr lang="en-US" sz="3000" dirty="0" smtClean="0">
-                <a:latin typeface="Times New Roman" panose="02020603050405020304" pitchFamily="18" charset="0"/>
-                <a:cs typeface="Times New Roman" panose="02020603050405020304" pitchFamily="18" charset="0"/>
-              </a:rPr>
-              <a:t>: </a:t>
-            </a:r>
-            <a:r>
-              <a:rPr lang="en-US" sz="3000" dirty="0">
-                <a:latin typeface="Times New Roman" panose="02020603050405020304" pitchFamily="18" charset="0"/>
-                <a:cs typeface="Times New Roman" panose="02020603050405020304" pitchFamily="18" charset="0"/>
-              </a:rPr>
-              <a:t>Switching characteristics in time domain obtained using Model </a:t>
+              <a:t>using Model </a:t>
             </a:r>
             <a:r>
               <a:rPr lang="tr-TR" sz="3000" dirty="0" smtClean="0">
@@ -9392,8 +9274,8 @@
         </p:nvSpPr>
         <p:spPr>
           <a:xfrm>
-            <a:off x="1003719" y="35618134"/>
-            <a:ext cx="13356985" cy="6740307"/>
+            <a:off x="996304" y="36470671"/>
+            <a:ext cx="13356985" cy="5632311"/>
           </a:xfrm>
           <a:prstGeom prst="rect">
             <a:avLst/>
@@ -9411,52 +9293,81 @@
               <a:buChar char="§"/>
             </a:pPr>
             <a:r>
+              <a:rPr lang="en-US" sz="3600" dirty="0" smtClean="0">
+                <a:latin typeface="Times New Roman" panose="02020603050405020304" pitchFamily="18" charset="0"/>
+                <a:cs typeface="Times New Roman" panose="02020603050405020304" pitchFamily="18" charset="0"/>
+              </a:rPr>
+              <a:t>The </a:t>
+            </a:r>
+            <a:r>
+              <a:rPr lang="en-US" sz="3600" b="1" dirty="0">
+                <a:latin typeface="Times New Roman" panose="02020603050405020304" pitchFamily="18" charset="0"/>
+                <a:cs typeface="Times New Roman" panose="02020603050405020304" pitchFamily="18" charset="0"/>
+              </a:rPr>
+              <a:t>third quadrant behavior of the GaN FETs are unique</a:t>
+            </a:r>
+            <a:r>
+              <a:rPr lang="en-US" sz="3600" dirty="0">
+                <a:latin typeface="Times New Roman" panose="02020603050405020304" pitchFamily="18" charset="0"/>
+                <a:cs typeface="Times New Roman" panose="02020603050405020304" pitchFamily="18" charset="0"/>
+              </a:rPr>
+              <a:t> because the channel is able to conduct in reverse direction with any </a:t>
+            </a:r>
+            <a:r>
+              <a:rPr lang="en-US" sz="3600" dirty="0" smtClean="0">
+                <a:latin typeface="Times New Roman" panose="02020603050405020304" pitchFamily="18" charset="0"/>
+                <a:cs typeface="Times New Roman" panose="02020603050405020304" pitchFamily="18" charset="0"/>
+              </a:rPr>
+              <a:t>gate-source</a:t>
+            </a:r>
+            <a:r>
               <a:rPr lang="tr-TR" sz="3600" dirty="0" smtClean="0">
                 <a:latin typeface="Times New Roman" panose="02020603050405020304" pitchFamily="18" charset="0"/>
                 <a:cs typeface="Times New Roman" panose="02020603050405020304" pitchFamily="18" charset="0"/>
               </a:rPr>
-              <a:t>The miller plateu where the current stays constant and voltage drops ideally can be seen in Fig. 8(d) easily.</a:t>
-            </a:r>
-          </a:p>
-          <a:p>
-            <a:pPr marL="571500" indent="-571500" algn="just">
-              <a:buFont typeface="Wingdings" panose="05000000000000000000" pitchFamily="2" charset="2"/>
-              <a:buChar char="§"/>
-            </a:pPr>
-            <a:r>
-              <a:rPr lang="en-US" sz="3600" dirty="0">
-                <a:latin typeface="Times New Roman" panose="02020603050405020304" pitchFamily="18" charset="0"/>
-                <a:cs typeface="Times New Roman" panose="02020603050405020304" pitchFamily="18" charset="0"/>
-              </a:rPr>
-              <a:t>The third quadrant behavior of the GaN FETs are unique because the channel is able to conduct in reverse direction with any </a:t>
+              <a:t> bias</a:t>
             </a:r>
             <a:r>
               <a:rPr lang="en-US" sz="3600" dirty="0" smtClean="0">
                 <a:latin typeface="Times New Roman" panose="02020603050405020304" pitchFamily="18" charset="0"/>
                 <a:cs typeface="Times New Roman" panose="02020603050405020304" pitchFamily="18" charset="0"/>
               </a:rPr>
-              <a:t>gate-source</a:t>
+              <a:t> </a:t>
             </a:r>
             <a:r>
               <a:rPr lang="tr-TR" sz="3600" dirty="0" smtClean="0">
                 <a:latin typeface="Times New Roman" panose="02020603050405020304" pitchFamily="18" charset="0"/>
                 <a:cs typeface="Times New Roman" panose="02020603050405020304" pitchFamily="18" charset="0"/>
               </a:rPr>
-              <a:t> bias</a:t>
-            </a:r>
-            <a:r>
-              <a:rPr lang="en-US" sz="3600" dirty="0" smtClean="0">
-                <a:latin typeface="Times New Roman" panose="02020603050405020304" pitchFamily="18" charset="0"/>
-                <a:cs typeface="Times New Roman" panose="02020603050405020304" pitchFamily="18" charset="0"/>
-              </a:rPr>
-              <a:t> </a:t>
+              <a:t>level. Therefore, the </a:t>
+            </a:r>
+            <a:r>
+              <a:rPr lang="tr-TR" sz="3600" b="1" dirty="0" smtClean="0">
+                <a:latin typeface="Times New Roman" panose="02020603050405020304" pitchFamily="18" charset="0"/>
+                <a:cs typeface="Times New Roman" panose="02020603050405020304" pitchFamily="18" charset="0"/>
+              </a:rPr>
+              <a:t>channel can conduct reversely without a positive gate bias </a:t>
             </a:r>
             <a:r>
               <a:rPr lang="tr-TR" sz="3600" dirty="0" smtClean="0">
                 <a:latin typeface="Times New Roman" panose="02020603050405020304" pitchFamily="18" charset="0"/>
                 <a:cs typeface="Times New Roman" panose="02020603050405020304" pitchFamily="18" charset="0"/>
               </a:rPr>
-              <a:t>level. Therefore, the channel can conduct reversely without a positive gate bias and similarly channel might not stop conduction even a negative gate bias is applied.</a:t>
+              <a:t>and similarly </a:t>
+            </a:r>
+            <a:r>
+              <a:rPr lang="tr-TR" sz="3600" b="1" dirty="0" smtClean="0">
+                <a:latin typeface="Times New Roman" panose="02020603050405020304" pitchFamily="18" charset="0"/>
+                <a:cs typeface="Times New Roman" panose="02020603050405020304" pitchFamily="18" charset="0"/>
+              </a:rPr>
+              <a:t>channel might not stop conduction even a negative gate bias is applied</a:t>
+            </a:r>
+            <a:r>
+              <a:rPr lang="tr-TR" sz="3600" dirty="0" smtClean="0">
+                <a:latin typeface="Times New Roman" panose="02020603050405020304" pitchFamily="18" charset="0"/>
+                <a:cs typeface="Times New Roman" panose="02020603050405020304" pitchFamily="18" charset="0"/>
+              </a:rPr>
+              <a:t>.</a:t>
             </a:r>
           </a:p>
           <a:p>
@@ -9510,10 +9421,10 @@
         </p:nvGrpSpPr>
         <p:grpSpPr>
           <a:xfrm>
-            <a:off x="15682905" y="25571494"/>
-            <a:ext cx="14035094" cy="5557397"/>
-            <a:chOff x="15682905" y="24314194"/>
-            <a:chExt cx="14035094" cy="5557397"/>
+            <a:off x="15682905" y="24542794"/>
+            <a:ext cx="14035094" cy="5747897"/>
+            <a:chOff x="15682905" y="23285494"/>
+            <a:chExt cx="14035094" cy="5747897"/>
           </a:xfrm>
         </p:grpSpPr>
         <p:pic>
@@ -9535,8 +9446,8 @@
           </p:blipFill>
           <p:spPr bwMode="auto">
             <a:xfrm>
-              <a:off x="16368085" y="24404730"/>
-              <a:ext cx="5400000" cy="4320000"/>
+              <a:off x="16368085" y="23299830"/>
+              <a:ext cx="5760000" cy="4680000"/>
             </a:xfrm>
             <a:prstGeom prst="rect">
               <a:avLst/>
@@ -9571,8 +9482,8 @@
           </p:blipFill>
           <p:spPr bwMode="auto">
             <a:xfrm>
-              <a:off x="23069980" y="24314194"/>
-              <a:ext cx="5400000" cy="4320000"/>
+              <a:off x="23069980" y="23285494"/>
+              <a:ext cx="5760000" cy="4680000"/>
             </a:xfrm>
             <a:prstGeom prst="rect">
               <a:avLst/>
@@ -9596,7 +9507,7 @@
           </p:nvSpPr>
           <p:spPr>
             <a:xfrm>
-              <a:off x="18112334" y="28684994"/>
+              <a:off x="18112334" y="27846794"/>
               <a:ext cx="4021241" cy="553998"/>
             </a:xfrm>
             <a:prstGeom prst="rect">
@@ -9618,10 +9529,6 @@
                 </a:rPr>
                 <a:t>(a) Turn-On</a:t>
               </a:r>
-              <a:endParaRPr lang="tr-TR" sz="3000" dirty="0" smtClean="0">
-                <a:latin typeface="Times New Roman" panose="02020603050405020304" pitchFamily="18" charset="0"/>
-                <a:cs typeface="Times New Roman" panose="02020603050405020304" pitchFamily="18" charset="0"/>
-              </a:endParaRPr>
             </a:p>
           </p:txBody>
         </p:sp>
@@ -9633,7 +9540,7 @@
           </p:nvSpPr>
           <p:spPr>
             <a:xfrm>
-              <a:off x="25125259" y="28724730"/>
+              <a:off x="25030009" y="27886530"/>
               <a:ext cx="4021241" cy="553998"/>
             </a:xfrm>
             <a:prstGeom prst="rect">
@@ -9655,10 +9562,6 @@
                 </a:rPr>
                 <a:t>(b) Turn-Off</a:t>
               </a:r>
-              <a:endParaRPr lang="tr-TR" sz="3000" dirty="0" smtClean="0">
-                <a:latin typeface="Times New Roman" panose="02020603050405020304" pitchFamily="18" charset="0"/>
-                <a:cs typeface="Times New Roman" panose="02020603050405020304" pitchFamily="18" charset="0"/>
-              </a:endParaRPr>
             </a:p>
           </p:txBody>
         </p:sp>
@@ -9670,7 +9573,7 @@
           </p:nvSpPr>
           <p:spPr>
             <a:xfrm>
-              <a:off x="15682905" y="29317593"/>
+              <a:off x="15682905" y="28479393"/>
               <a:ext cx="14035094" cy="553998"/>
             </a:xfrm>
             <a:prstGeom prst="rect">
@@ -9685,32 +9588,32 @@
             <a:lstStyle/>
             <a:p>
               <a:r>
-                <a:rPr lang="en-US" sz="3000" dirty="0">
+                <a:rPr lang="en-US" sz="3000" dirty="0" smtClean="0">
                   <a:latin typeface="Times New Roman" panose="02020603050405020304" pitchFamily="18" charset="0"/>
                   <a:cs typeface="Times New Roman" panose="02020603050405020304" pitchFamily="18" charset="0"/>
                 </a:rPr>
-                <a:t>Fig. </a:t>
+                <a:t>Switching </a:t>
               </a:r>
               <a:r>
                 <a:rPr lang="tr-TR" sz="3000" dirty="0" smtClean="0">
                   <a:latin typeface="Times New Roman" panose="02020603050405020304" pitchFamily="18" charset="0"/>
                   <a:cs typeface="Times New Roman" panose="02020603050405020304" pitchFamily="18" charset="0"/>
                 </a:rPr>
-                <a:t>11</a:t>
+                <a:t>waveforms</a:t>
               </a:r>
               <a:r>
                 <a:rPr lang="en-US" sz="3000" dirty="0" smtClean="0">
                   <a:latin typeface="Times New Roman" panose="02020603050405020304" pitchFamily="18" charset="0"/>
                   <a:cs typeface="Times New Roman" panose="02020603050405020304" pitchFamily="18" charset="0"/>
                 </a:rPr>
-                <a:t>: </a:t>
+                <a:t> </a:t>
               </a:r>
               <a:r>
                 <a:rPr lang="en-US" sz="3000" dirty="0">
                   <a:latin typeface="Times New Roman" panose="02020603050405020304" pitchFamily="18" charset="0"/>
                   <a:cs typeface="Times New Roman" panose="02020603050405020304" pitchFamily="18" charset="0"/>
                 </a:rPr>
-                <a:t>Switching characteristics for different turn-on and turn-off resistances (Model 3)</a:t>
+                <a:t>for different turn-on and turn-off resistances (Model 3)</a:t>
               </a:r>
               <a:endParaRPr lang="tr-TR" sz="3000" dirty="0">
                 <a:latin typeface="Times New Roman" panose="02020603050405020304" pitchFamily="18" charset="0"/>
@@ -9728,8 +9631,8 @@
         </p:nvSpPr>
         <p:spPr>
           <a:xfrm>
-            <a:off x="16502492" y="24524512"/>
-            <a:ext cx="13504678" cy="707886"/>
+            <a:off x="16502492" y="23756589"/>
+            <a:ext cx="13504678" cy="643533"/>
           </a:xfrm>
           <a:prstGeom prst="rect">
             <a:avLst/>

</xml_diff>